<commit_message>
ppt avec animation , fond a faire
</commit_message>
<xml_diff>
--- a/PrésentationBourseEchangeSCPI.pptx
+++ b/PrésentationBourseEchangeSCPI.pptx
@@ -12,6 +12,19 @@
     <p:sldId id="260" r:id="rId6"/>
     <p:sldId id="261" r:id="rId7"/>
     <p:sldId id="262" r:id="rId8"/>
+    <p:sldId id="268" r:id="rId9"/>
+    <p:sldId id="264" r:id="rId10"/>
+    <p:sldId id="263" r:id="rId11"/>
+    <p:sldId id="265" r:id="rId12"/>
+    <p:sldId id="266" r:id="rId13"/>
+    <p:sldId id="267" r:id="rId14"/>
+    <p:sldId id="269" r:id="rId15"/>
+    <p:sldId id="270" r:id="rId16"/>
+    <p:sldId id="271" r:id="rId17"/>
+    <p:sldId id="275" r:id="rId18"/>
+    <p:sldId id="276" r:id="rId19"/>
+    <p:sldId id="277" r:id="rId20"/>
+    <p:sldId id="278" r:id="rId21"/>
   </p:sldIdLst>
   <p:sldSz cx="12192000" cy="6858000"/>
   <p:notesSz cx="6858000" cy="9144000"/>
@@ -339,6 +352,18 @@
   <p:clrMapOvr>
     <a:masterClrMapping/>
   </p:clrMapOvr>
+  <mc:AlternateContent xmlns:mc="http://schemas.openxmlformats.org/markup-compatibility/2006">
+    <mc:Choice xmlns:p14="http://schemas.microsoft.com/office/powerpoint/2010/main" Requires="p14">
+      <p:transition spd="med" p14:dur="700">
+        <p:fade/>
+      </p:transition>
+    </mc:Choice>
+    <mc:Fallback>
+      <p:transition spd="med">
+        <p:fade/>
+      </p:transition>
+    </mc:Fallback>
+  </mc:AlternateContent>
 </p:sldLayout>
 </file>
 
@@ -537,6 +562,18 @@
   <p:clrMapOvr>
     <a:masterClrMapping/>
   </p:clrMapOvr>
+  <mc:AlternateContent xmlns:mc="http://schemas.openxmlformats.org/markup-compatibility/2006">
+    <mc:Choice xmlns:p14="http://schemas.microsoft.com/office/powerpoint/2010/main" Requires="p14">
+      <p:transition spd="med" p14:dur="700">
+        <p:fade/>
+      </p:transition>
+    </mc:Choice>
+    <mc:Fallback>
+      <p:transition spd="med">
+        <p:fade/>
+      </p:transition>
+    </mc:Fallback>
+  </mc:AlternateContent>
 </p:sldLayout>
 </file>
 
@@ -745,6 +782,18 @@
   <p:clrMapOvr>
     <a:masterClrMapping/>
   </p:clrMapOvr>
+  <mc:AlternateContent xmlns:mc="http://schemas.openxmlformats.org/markup-compatibility/2006">
+    <mc:Choice xmlns:p14="http://schemas.microsoft.com/office/powerpoint/2010/main" Requires="p14">
+      <p:transition spd="med" p14:dur="700">
+        <p:fade/>
+      </p:transition>
+    </mc:Choice>
+    <mc:Fallback>
+      <p:transition spd="med">
+        <p:fade/>
+      </p:transition>
+    </mc:Fallback>
+  </mc:AlternateContent>
 </p:sldLayout>
 </file>
 
@@ -943,6 +992,18 @@
   <p:clrMapOvr>
     <a:masterClrMapping/>
   </p:clrMapOvr>
+  <mc:AlternateContent xmlns:mc="http://schemas.openxmlformats.org/markup-compatibility/2006">
+    <mc:Choice xmlns:p14="http://schemas.microsoft.com/office/powerpoint/2010/main" Requires="p14">
+      <p:transition spd="med" p14:dur="700">
+        <p:fade/>
+      </p:transition>
+    </mc:Choice>
+    <mc:Fallback>
+      <p:transition spd="med">
+        <p:fade/>
+      </p:transition>
+    </mc:Fallback>
+  </mc:AlternateContent>
 </p:sldLayout>
 </file>
 
@@ -1218,6 +1279,18 @@
   <p:clrMapOvr>
     <a:masterClrMapping/>
   </p:clrMapOvr>
+  <mc:AlternateContent xmlns:mc="http://schemas.openxmlformats.org/markup-compatibility/2006">
+    <mc:Choice xmlns:p14="http://schemas.microsoft.com/office/powerpoint/2010/main" Requires="p14">
+      <p:transition spd="med" p14:dur="700">
+        <p:fade/>
+      </p:transition>
+    </mc:Choice>
+    <mc:Fallback>
+      <p:transition spd="med">
+        <p:fade/>
+      </p:transition>
+    </mc:Fallback>
+  </mc:AlternateContent>
 </p:sldLayout>
 </file>
 
@@ -1483,6 +1556,18 @@
   <p:clrMapOvr>
     <a:masterClrMapping/>
   </p:clrMapOvr>
+  <mc:AlternateContent xmlns:mc="http://schemas.openxmlformats.org/markup-compatibility/2006">
+    <mc:Choice xmlns:p14="http://schemas.microsoft.com/office/powerpoint/2010/main" Requires="p14">
+      <p:transition spd="med" p14:dur="700">
+        <p:fade/>
+      </p:transition>
+    </mc:Choice>
+    <mc:Fallback>
+      <p:transition spd="med">
+        <p:fade/>
+      </p:transition>
+    </mc:Fallback>
+  </mc:AlternateContent>
 </p:sldLayout>
 </file>
 
@@ -1895,6 +1980,18 @@
   <p:clrMapOvr>
     <a:masterClrMapping/>
   </p:clrMapOvr>
+  <mc:AlternateContent xmlns:mc="http://schemas.openxmlformats.org/markup-compatibility/2006">
+    <mc:Choice xmlns:p14="http://schemas.microsoft.com/office/powerpoint/2010/main" Requires="p14">
+      <p:transition spd="med" p14:dur="700">
+        <p:fade/>
+      </p:transition>
+    </mc:Choice>
+    <mc:Fallback>
+      <p:transition spd="med">
+        <p:fade/>
+      </p:transition>
+    </mc:Fallback>
+  </mc:AlternateContent>
 </p:sldLayout>
 </file>
 
@@ -2036,6 +2133,18 @@
   <p:clrMapOvr>
     <a:masterClrMapping/>
   </p:clrMapOvr>
+  <mc:AlternateContent xmlns:mc="http://schemas.openxmlformats.org/markup-compatibility/2006">
+    <mc:Choice xmlns:p14="http://schemas.microsoft.com/office/powerpoint/2010/main" Requires="p14">
+      <p:transition spd="med" p14:dur="700">
+        <p:fade/>
+      </p:transition>
+    </mc:Choice>
+    <mc:Fallback>
+      <p:transition spd="med">
+        <p:fade/>
+      </p:transition>
+    </mc:Fallback>
+  </mc:AlternateContent>
 </p:sldLayout>
 </file>
 
@@ -2149,6 +2258,18 @@
   <p:clrMapOvr>
     <a:masterClrMapping/>
   </p:clrMapOvr>
+  <mc:AlternateContent xmlns:mc="http://schemas.openxmlformats.org/markup-compatibility/2006">
+    <mc:Choice xmlns:p14="http://schemas.microsoft.com/office/powerpoint/2010/main" Requires="p14">
+      <p:transition spd="med" p14:dur="700">
+        <p:fade/>
+      </p:transition>
+    </mc:Choice>
+    <mc:Fallback>
+      <p:transition spd="med">
+        <p:fade/>
+      </p:transition>
+    </mc:Fallback>
+  </mc:AlternateContent>
 </p:sldLayout>
 </file>
 
@@ -2460,6 +2581,18 @@
   <p:clrMapOvr>
     <a:masterClrMapping/>
   </p:clrMapOvr>
+  <mc:AlternateContent xmlns:mc="http://schemas.openxmlformats.org/markup-compatibility/2006">
+    <mc:Choice xmlns:p14="http://schemas.microsoft.com/office/powerpoint/2010/main" Requires="p14">
+      <p:transition spd="med" p14:dur="700">
+        <p:fade/>
+      </p:transition>
+    </mc:Choice>
+    <mc:Fallback>
+      <p:transition spd="med">
+        <p:fade/>
+      </p:transition>
+    </mc:Fallback>
+  </mc:AlternateContent>
 </p:sldLayout>
 </file>
 
@@ -2748,6 +2881,18 @@
   <p:clrMapOvr>
     <a:masterClrMapping/>
   </p:clrMapOvr>
+  <mc:AlternateContent xmlns:mc="http://schemas.openxmlformats.org/markup-compatibility/2006">
+    <mc:Choice xmlns:p14="http://schemas.microsoft.com/office/powerpoint/2010/main" Requires="p14">
+      <p:transition spd="med" p14:dur="700">
+        <p:fade/>
+      </p:transition>
+    </mc:Choice>
+    <mc:Fallback>
+      <p:transition spd="med">
+        <p:fade/>
+      </p:transition>
+    </mc:Fallback>
+  </mc:AlternateContent>
 </p:sldLayout>
 </file>
 
@@ -3036,6 +3181,18 @@
     <p:sldLayoutId id="2147483658" r:id="rId10"/>
     <p:sldLayoutId id="2147483659" r:id="rId11"/>
   </p:sldLayoutIdLst>
+  <mc:AlternateContent xmlns:mc="http://schemas.openxmlformats.org/markup-compatibility/2006">
+    <mc:Choice xmlns:p14="http://schemas.microsoft.com/office/powerpoint/2010/main" Requires="p14">
+      <p:transition spd="med" p14:dur="700">
+        <p:fade/>
+      </p:transition>
+    </mc:Choice>
+    <mc:Fallback>
+      <p:transition spd="med">
+        <p:fade/>
+      </p:transition>
+    </mc:Fallback>
+  </mc:AlternateContent>
   <p:txStyles>
     <p:titleStyle>
       <a:lvl1pPr algn="l" defTabSz="914400" rtl="0" eaLnBrk="1" latinLnBrk="0" hangingPunct="1">
@@ -3552,6 +3709,1301 @@
   <p:clrMapOvr>
     <a:masterClrMapping/>
   </p:clrMapOvr>
+  <mc:AlternateContent xmlns:mc="http://schemas.openxmlformats.org/markup-compatibility/2006">
+    <mc:Choice xmlns:p14="http://schemas.microsoft.com/office/powerpoint/2010/main" Requires="p14">
+      <p:transition spd="med" p14:dur="700">
+        <p:fade/>
+      </p:transition>
+    </mc:Choice>
+    <mc:Fallback>
+      <p:transition spd="med">
+        <p:fade/>
+      </p:transition>
+    </mc:Fallback>
+  </mc:AlternateContent>
+</p:sld>
+</file>
+
+<file path=ppt/slides/slide10.xml><?xml version="1.0" encoding="utf-8"?>
+<p:sld xmlns:a="http://schemas.openxmlformats.org/drawingml/2006/main" xmlns:r="http://schemas.openxmlformats.org/officeDocument/2006/relationships" xmlns:p="http://schemas.openxmlformats.org/presentationml/2006/main">
+  <p:cSld>
+    <p:spTree>
+      <p:nvGrpSpPr>
+        <p:cNvPr id="1" name=""/>
+        <p:cNvGrpSpPr/>
+        <p:nvPr/>
+      </p:nvGrpSpPr>
+      <p:grpSpPr>
+        <a:xfrm>
+          <a:off x="0" y="0"/>
+          <a:ext cx="0" cy="0"/>
+          <a:chOff x="0" y="0"/>
+          <a:chExt cx="0" cy="0"/>
+        </a:xfrm>
+      </p:grpSpPr>
+      <p:sp>
+        <p:nvSpPr>
+          <p:cNvPr id="2" name="Titre 1">
+            <a:extLst>
+              <a:ext uri="{FF2B5EF4-FFF2-40B4-BE49-F238E27FC236}">
+                <a16:creationId xmlns:a16="http://schemas.microsoft.com/office/drawing/2014/main" id="{07AC08FA-4102-4FAB-83C9-B45414E26700}"/>
+              </a:ext>
+            </a:extLst>
+          </p:cNvPr>
+          <p:cNvSpPr>
+            <a:spLocks noGrp="1"/>
+          </p:cNvSpPr>
+          <p:nvPr>
+            <p:ph type="title"/>
+          </p:nvPr>
+        </p:nvSpPr>
+        <p:spPr/>
+        <p:txBody>
+          <a:bodyPr/>
+          <a:lstStyle/>
+          <a:p>
+            <a:pPr algn="ctr"/>
+            <a:r>
+              <a:rPr lang="fr-FR" dirty="0"/>
+              <a:t>Arborescence du site</a:t>
+            </a:r>
+          </a:p>
+        </p:txBody>
+      </p:sp>
+      <p:sp>
+        <p:nvSpPr>
+          <p:cNvPr id="3" name="Espace réservé du contenu 2">
+            <a:extLst>
+              <a:ext uri="{FF2B5EF4-FFF2-40B4-BE49-F238E27FC236}">
+                <a16:creationId xmlns:a16="http://schemas.microsoft.com/office/drawing/2014/main" id="{BAD76280-D744-41A9-A90C-492279FC5515}"/>
+              </a:ext>
+            </a:extLst>
+          </p:cNvPr>
+          <p:cNvSpPr>
+            <a:spLocks noGrp="1"/>
+          </p:cNvSpPr>
+          <p:nvPr>
+            <p:ph idx="1"/>
+          </p:nvPr>
+        </p:nvSpPr>
+        <p:spPr/>
+        <p:txBody>
+          <a:bodyPr/>
+          <a:lstStyle/>
+          <a:p>
+            <a:endParaRPr lang="fr-FR" dirty="0"/>
+          </a:p>
+          <a:p>
+            <a:r>
+              <a:rPr lang="fr-FR" dirty="0"/>
+              <a:t>Page d’accueil</a:t>
+            </a:r>
+          </a:p>
+          <a:p>
+            <a:endParaRPr lang="fr-FR" dirty="0"/>
+          </a:p>
+          <a:p>
+            <a:r>
+              <a:rPr lang="fr-FR" dirty="0"/>
+              <a:t>Page de login</a:t>
+            </a:r>
+          </a:p>
+          <a:p>
+            <a:endParaRPr lang="fr-FR" dirty="0"/>
+          </a:p>
+          <a:p>
+            <a:r>
+              <a:rPr lang="fr-FR" dirty="0"/>
+              <a:t>Page admin</a:t>
+            </a:r>
+          </a:p>
+          <a:p>
+            <a:endParaRPr lang="fr-FR" dirty="0"/>
+          </a:p>
+          <a:p>
+            <a:endParaRPr lang="fr-FR" dirty="0"/>
+          </a:p>
+        </p:txBody>
+      </p:sp>
+      <p:pic>
+        <p:nvPicPr>
+          <p:cNvPr id="5" name="Image 4">
+            <a:extLst>
+              <a:ext uri="{FF2B5EF4-FFF2-40B4-BE49-F238E27FC236}">
+                <a16:creationId xmlns:a16="http://schemas.microsoft.com/office/drawing/2014/main" id="{F818E70A-3876-4FB4-A9BE-603CE8BCD2CE}"/>
+              </a:ext>
+            </a:extLst>
+          </p:cNvPr>
+          <p:cNvPicPr>
+            <a:picLocks noChangeAspect="1"/>
+          </p:cNvPicPr>
+          <p:nvPr/>
+        </p:nvPicPr>
+        <p:blipFill>
+          <a:blip r:embed="rId2">
+            <a:extLst>
+              <a:ext uri="{28A0092B-C50C-407E-A947-70E740481C1C}">
+                <a14:useLocalDpi xmlns:a14="http://schemas.microsoft.com/office/drawing/2010/main" val="0"/>
+              </a:ext>
+            </a:extLst>
+          </a:blip>
+          <a:stretch>
+            <a:fillRect/>
+          </a:stretch>
+        </p:blipFill>
+        <p:spPr>
+          <a:xfrm>
+            <a:off x="4495800" y="1690688"/>
+            <a:ext cx="6858000" cy="3810000"/>
+          </a:xfrm>
+          <a:prstGeom prst="rect">
+            <a:avLst/>
+          </a:prstGeom>
+        </p:spPr>
+      </p:pic>
+    </p:spTree>
+    <p:extLst>
+      <p:ext uri="{BB962C8B-B14F-4D97-AF65-F5344CB8AC3E}">
+        <p14:creationId xmlns:p14="http://schemas.microsoft.com/office/powerpoint/2010/main" val="1478893861"/>
+      </p:ext>
+    </p:extLst>
+  </p:cSld>
+  <p:clrMapOvr>
+    <a:masterClrMapping/>
+  </p:clrMapOvr>
+  <p:transition spd="med">
+    <p:pull/>
+  </p:transition>
+</p:sld>
+</file>
+
+<file path=ppt/slides/slide11.xml><?xml version="1.0" encoding="utf-8"?>
+<p:sld xmlns:a="http://schemas.openxmlformats.org/drawingml/2006/main" xmlns:r="http://schemas.openxmlformats.org/officeDocument/2006/relationships" xmlns:p="http://schemas.openxmlformats.org/presentationml/2006/main">
+  <p:cSld>
+    <p:spTree>
+      <p:nvGrpSpPr>
+        <p:cNvPr id="1" name=""/>
+        <p:cNvGrpSpPr/>
+        <p:nvPr/>
+      </p:nvGrpSpPr>
+      <p:grpSpPr>
+        <a:xfrm>
+          <a:off x="0" y="0"/>
+          <a:ext cx="0" cy="0"/>
+          <a:chOff x="0" y="0"/>
+          <a:chExt cx="0" cy="0"/>
+        </a:xfrm>
+      </p:grpSpPr>
+      <p:sp>
+        <p:nvSpPr>
+          <p:cNvPr id="2" name="Titre 1">
+            <a:extLst>
+              <a:ext uri="{FF2B5EF4-FFF2-40B4-BE49-F238E27FC236}">
+                <a16:creationId xmlns:a16="http://schemas.microsoft.com/office/drawing/2014/main" id="{F5FCEA1B-D7A3-4DB5-8E50-00AD4ADD5794}"/>
+              </a:ext>
+            </a:extLst>
+          </p:cNvPr>
+          <p:cNvSpPr>
+            <a:spLocks noGrp="1"/>
+          </p:cNvSpPr>
+          <p:nvPr>
+            <p:ph type="title"/>
+          </p:nvPr>
+        </p:nvSpPr>
+        <p:spPr/>
+        <p:txBody>
+          <a:bodyPr/>
+          <a:lstStyle/>
+          <a:p>
+            <a:pPr algn="ctr"/>
+            <a:r>
+              <a:rPr lang="fr-FR" dirty="0"/>
+              <a:t>Spécifications fonctionnels</a:t>
+            </a:r>
+          </a:p>
+        </p:txBody>
+      </p:sp>
+      <p:sp>
+        <p:nvSpPr>
+          <p:cNvPr id="3" name="Espace réservé du contenu 2">
+            <a:extLst>
+              <a:ext uri="{FF2B5EF4-FFF2-40B4-BE49-F238E27FC236}">
+                <a16:creationId xmlns:a16="http://schemas.microsoft.com/office/drawing/2014/main" id="{EFE3CD6E-8AEE-4AC8-A337-28FDB8654D9C}"/>
+              </a:ext>
+            </a:extLst>
+          </p:cNvPr>
+          <p:cNvSpPr>
+            <a:spLocks noGrp="1"/>
+          </p:cNvSpPr>
+          <p:nvPr>
+            <p:ph idx="1"/>
+          </p:nvPr>
+        </p:nvSpPr>
+        <p:spPr/>
+        <p:txBody>
+          <a:bodyPr/>
+          <a:lstStyle/>
+          <a:p>
+            <a:endParaRPr lang="fr-FR" dirty="0"/>
+          </a:p>
+          <a:p>
+            <a:r>
+              <a:rPr lang="fr-FR" dirty="0"/>
+              <a:t>Listing des biens</a:t>
+            </a:r>
+          </a:p>
+          <a:p>
+            <a:r>
+              <a:rPr lang="fr-FR" dirty="0"/>
+              <a:t>Etat de vente</a:t>
+            </a:r>
+          </a:p>
+          <a:p>
+            <a:endParaRPr lang="fr-FR" dirty="0"/>
+          </a:p>
+          <a:p>
+            <a:r>
+              <a:rPr lang="fr-FR" dirty="0"/>
+              <a:t>Mise en vente des biens</a:t>
+            </a:r>
+          </a:p>
+          <a:p>
+            <a:endParaRPr lang="fr-FR" dirty="0"/>
+          </a:p>
+          <a:p>
+            <a:r>
+              <a:rPr lang="fr-FR" dirty="0"/>
+              <a:t>Accès a tous les biens</a:t>
+            </a:r>
+          </a:p>
+        </p:txBody>
+      </p:sp>
+      <p:pic>
+        <p:nvPicPr>
+          <p:cNvPr id="5" name="Image 4">
+            <a:extLst>
+              <a:ext uri="{FF2B5EF4-FFF2-40B4-BE49-F238E27FC236}">
+                <a16:creationId xmlns:a16="http://schemas.microsoft.com/office/drawing/2014/main" id="{5546D65D-A2E8-44F5-93FC-4D9993B85A0A}"/>
+              </a:ext>
+            </a:extLst>
+          </p:cNvPr>
+          <p:cNvPicPr>
+            <a:picLocks noChangeAspect="1"/>
+          </p:cNvPicPr>
+          <p:nvPr/>
+        </p:nvPicPr>
+        <p:blipFill>
+          <a:blip r:embed="rId2">
+            <a:extLst>
+              <a:ext uri="{28A0092B-C50C-407E-A947-70E740481C1C}">
+                <a14:useLocalDpi xmlns:a14="http://schemas.microsoft.com/office/drawing/2010/main" val="0"/>
+              </a:ext>
+            </a:extLst>
+          </a:blip>
+          <a:stretch>
+            <a:fillRect/>
+          </a:stretch>
+        </p:blipFill>
+        <p:spPr>
+          <a:xfrm>
+            <a:off x="5354471" y="1825625"/>
+            <a:ext cx="5999329" cy="3332961"/>
+          </a:xfrm>
+          <a:prstGeom prst="rect">
+            <a:avLst/>
+          </a:prstGeom>
+        </p:spPr>
+      </p:pic>
+    </p:spTree>
+    <p:extLst>
+      <p:ext uri="{BB962C8B-B14F-4D97-AF65-F5344CB8AC3E}">
+        <p14:creationId xmlns:p14="http://schemas.microsoft.com/office/powerpoint/2010/main" val="3136308757"/>
+      </p:ext>
+    </p:extLst>
+  </p:cSld>
+  <p:clrMapOvr>
+    <a:masterClrMapping/>
+  </p:clrMapOvr>
+  <p:transition spd="med">
+    <p:pull/>
+  </p:transition>
+</p:sld>
+</file>
+
+<file path=ppt/slides/slide12.xml><?xml version="1.0" encoding="utf-8"?>
+<p:sld xmlns:a="http://schemas.openxmlformats.org/drawingml/2006/main" xmlns:r="http://schemas.openxmlformats.org/officeDocument/2006/relationships" xmlns:p="http://schemas.openxmlformats.org/presentationml/2006/main">
+  <p:cSld>
+    <p:spTree>
+      <p:nvGrpSpPr>
+        <p:cNvPr id="1" name=""/>
+        <p:cNvGrpSpPr/>
+        <p:nvPr/>
+      </p:nvGrpSpPr>
+      <p:grpSpPr>
+        <a:xfrm>
+          <a:off x="0" y="0"/>
+          <a:ext cx="0" cy="0"/>
+          <a:chOff x="0" y="0"/>
+          <a:chExt cx="0" cy="0"/>
+        </a:xfrm>
+      </p:grpSpPr>
+      <p:sp>
+        <p:nvSpPr>
+          <p:cNvPr id="2" name="Titre 1">
+            <a:extLst>
+              <a:ext uri="{FF2B5EF4-FFF2-40B4-BE49-F238E27FC236}">
+                <a16:creationId xmlns:a16="http://schemas.microsoft.com/office/drawing/2014/main" id="{E9C9AF36-E179-4ACE-B160-CB584315E77F}"/>
+              </a:ext>
+            </a:extLst>
+          </p:cNvPr>
+          <p:cNvSpPr>
+            <a:spLocks noGrp="1"/>
+          </p:cNvSpPr>
+          <p:nvPr>
+            <p:ph type="title"/>
+          </p:nvPr>
+        </p:nvSpPr>
+        <p:spPr/>
+        <p:txBody>
+          <a:bodyPr/>
+          <a:lstStyle/>
+          <a:p>
+            <a:pPr algn="ctr"/>
+            <a:r>
+              <a:rPr lang="fr-FR" dirty="0"/>
+              <a:t>Spécifications techniques</a:t>
+            </a:r>
+          </a:p>
+        </p:txBody>
+      </p:sp>
+      <p:sp>
+        <p:nvSpPr>
+          <p:cNvPr id="3" name="Espace réservé du contenu 2">
+            <a:extLst>
+              <a:ext uri="{FF2B5EF4-FFF2-40B4-BE49-F238E27FC236}">
+                <a16:creationId xmlns:a16="http://schemas.microsoft.com/office/drawing/2014/main" id="{D9F08E6F-D9AA-410C-A413-E05EEDE6A87F}"/>
+              </a:ext>
+            </a:extLst>
+          </p:cNvPr>
+          <p:cNvSpPr>
+            <a:spLocks noGrp="1"/>
+          </p:cNvSpPr>
+          <p:nvPr>
+            <p:ph idx="1"/>
+          </p:nvPr>
+        </p:nvSpPr>
+        <p:spPr/>
+        <p:txBody>
+          <a:bodyPr/>
+          <a:lstStyle/>
+          <a:p>
+            <a:endParaRPr lang="fr-FR" dirty="0"/>
+          </a:p>
+          <a:p>
+            <a:r>
+              <a:rPr lang="fr-FR" dirty="0"/>
+              <a:t>Ajout au système existant</a:t>
+            </a:r>
+          </a:p>
+          <a:p>
+            <a:r>
+              <a:rPr lang="fr-FR" dirty="0" err="1"/>
+              <a:t>JavaEE</a:t>
+            </a:r>
+            <a:endParaRPr lang="fr-FR" dirty="0"/>
+          </a:p>
+          <a:p>
+            <a:r>
+              <a:rPr lang="fr-FR" dirty="0"/>
+              <a:t>Modèle MVC2</a:t>
+            </a:r>
+          </a:p>
+          <a:p>
+            <a:r>
+              <a:rPr lang="fr-FR" dirty="0"/>
+              <a:t>Base de Données</a:t>
+            </a:r>
+          </a:p>
+          <a:p>
+            <a:r>
+              <a:rPr lang="fr-FR" dirty="0"/>
+              <a:t>Statut</a:t>
+            </a:r>
+          </a:p>
+          <a:p>
+            <a:r>
+              <a:rPr lang="fr-FR" dirty="0"/>
+              <a:t>Gérer les biens</a:t>
+            </a:r>
+          </a:p>
+          <a:p>
+            <a:r>
+              <a:rPr lang="fr-FR" dirty="0"/>
+              <a:t>Accès a la liste des biens en ventes</a:t>
+            </a:r>
+          </a:p>
+        </p:txBody>
+      </p:sp>
+      <p:pic>
+        <p:nvPicPr>
+          <p:cNvPr id="5" name="Image 4">
+            <a:extLst>
+              <a:ext uri="{FF2B5EF4-FFF2-40B4-BE49-F238E27FC236}">
+                <a16:creationId xmlns:a16="http://schemas.microsoft.com/office/drawing/2014/main" id="{9BF1A325-6391-4334-BEF5-1BC87A6804D4}"/>
+              </a:ext>
+            </a:extLst>
+          </p:cNvPr>
+          <p:cNvPicPr>
+            <a:picLocks noChangeAspect="1"/>
+          </p:cNvPicPr>
+          <p:nvPr/>
+        </p:nvPicPr>
+        <p:blipFill>
+          <a:blip r:embed="rId2">
+            <a:extLst>
+              <a:ext uri="{28A0092B-C50C-407E-A947-70E740481C1C}">
+                <a14:useLocalDpi xmlns:a14="http://schemas.microsoft.com/office/drawing/2010/main" val="0"/>
+              </a:ext>
+            </a:extLst>
+          </a:blip>
+          <a:stretch>
+            <a:fillRect/>
+          </a:stretch>
+        </p:blipFill>
+        <p:spPr>
+          <a:xfrm>
+            <a:off x="6096000" y="1690688"/>
+            <a:ext cx="4504944" cy="3480816"/>
+          </a:xfrm>
+          <a:prstGeom prst="rect">
+            <a:avLst/>
+          </a:prstGeom>
+        </p:spPr>
+      </p:pic>
+    </p:spTree>
+    <p:extLst>
+      <p:ext uri="{BB962C8B-B14F-4D97-AF65-F5344CB8AC3E}">
+        <p14:creationId xmlns:p14="http://schemas.microsoft.com/office/powerpoint/2010/main" val="2415510372"/>
+      </p:ext>
+    </p:extLst>
+  </p:cSld>
+  <p:clrMapOvr>
+    <a:masterClrMapping/>
+  </p:clrMapOvr>
+  <p:transition spd="med">
+    <p:pull/>
+  </p:transition>
+</p:sld>
+</file>
+
+<file path=ppt/slides/slide13.xml><?xml version="1.0" encoding="utf-8"?>
+<p:sld xmlns:a="http://schemas.openxmlformats.org/drawingml/2006/main" xmlns:r="http://schemas.openxmlformats.org/officeDocument/2006/relationships" xmlns:p="http://schemas.openxmlformats.org/presentationml/2006/main">
+  <p:cSld>
+    <p:spTree>
+      <p:nvGrpSpPr>
+        <p:cNvPr id="1" name=""/>
+        <p:cNvGrpSpPr/>
+        <p:nvPr/>
+      </p:nvGrpSpPr>
+      <p:grpSpPr>
+        <a:xfrm>
+          <a:off x="0" y="0"/>
+          <a:ext cx="0" cy="0"/>
+          <a:chOff x="0" y="0"/>
+          <a:chExt cx="0" cy="0"/>
+        </a:xfrm>
+      </p:grpSpPr>
+      <p:sp>
+        <p:nvSpPr>
+          <p:cNvPr id="2" name="Titre 1">
+            <a:extLst>
+              <a:ext uri="{FF2B5EF4-FFF2-40B4-BE49-F238E27FC236}">
+                <a16:creationId xmlns:a16="http://schemas.microsoft.com/office/drawing/2014/main" id="{B30CA086-C46F-497B-B651-85FF6DECA0D4}"/>
+              </a:ext>
+            </a:extLst>
+          </p:cNvPr>
+          <p:cNvSpPr>
+            <a:spLocks noGrp="1"/>
+          </p:cNvSpPr>
+          <p:nvPr>
+            <p:ph type="title"/>
+          </p:nvPr>
+        </p:nvSpPr>
+        <p:spPr/>
+        <p:txBody>
+          <a:bodyPr/>
+          <a:lstStyle/>
+          <a:p>
+            <a:pPr algn="ctr"/>
+            <a:r>
+              <a:rPr lang="fr-FR" dirty="0"/>
+              <a:t>Contexte technique organisationnelle</a:t>
+            </a:r>
+          </a:p>
+        </p:txBody>
+      </p:sp>
+      <p:pic>
+        <p:nvPicPr>
+          <p:cNvPr id="5" name="Espace réservé du contenu 4" descr="https://lh3.googleusercontent.com/IArW1KUNcasSuTg1EgSXNmwYNhrhgeiCeBXLavAV9uGip-P2v1VL6YSP_xzAfDIZEDv1CeO6YuDwALLGn2P-Dg51Jo5iHy_D9UIds8FioTaYNAlyEWeAFpf6aRuZIMFVYnmJTozB">
+            <a:extLst>
+              <a:ext uri="{FF2B5EF4-FFF2-40B4-BE49-F238E27FC236}">
+                <a16:creationId xmlns:a16="http://schemas.microsoft.com/office/drawing/2014/main" id="{FB0950C9-3D7C-47E0-A6F4-F4E268B16273}"/>
+              </a:ext>
+            </a:extLst>
+          </p:cNvPr>
+          <p:cNvPicPr>
+            <a:picLocks noGrp="1"/>
+          </p:cNvPicPr>
+          <p:nvPr>
+            <p:ph idx="1"/>
+          </p:nvPr>
+        </p:nvPicPr>
+        <p:blipFill>
+          <a:blip r:embed="rId2">
+            <a:extLst>
+              <a:ext uri="{28A0092B-C50C-407E-A947-70E740481C1C}">
+                <a14:useLocalDpi xmlns:a14="http://schemas.microsoft.com/office/drawing/2010/main" val="0"/>
+              </a:ext>
+            </a:extLst>
+          </a:blip>
+          <a:srcRect/>
+          <a:stretch>
+            <a:fillRect/>
+          </a:stretch>
+        </p:blipFill>
+        <p:spPr bwMode="auto">
+          <a:xfrm>
+            <a:off x="2380858" y="1690688"/>
+            <a:ext cx="7430284" cy="4351338"/>
+          </a:xfrm>
+          <a:prstGeom prst="rect">
+            <a:avLst/>
+          </a:prstGeom>
+          <a:noFill/>
+          <a:ln>
+            <a:noFill/>
+          </a:ln>
+        </p:spPr>
+      </p:pic>
+      <p:sp>
+        <p:nvSpPr>
+          <p:cNvPr id="6" name="ZoneTexte 5">
+            <a:extLst>
+              <a:ext uri="{FF2B5EF4-FFF2-40B4-BE49-F238E27FC236}">
+                <a16:creationId xmlns:a16="http://schemas.microsoft.com/office/drawing/2014/main" id="{8F2FCC54-89BE-463B-9BD0-324622C29EFA}"/>
+              </a:ext>
+            </a:extLst>
+          </p:cNvPr>
+          <p:cNvSpPr txBox="1"/>
+          <p:nvPr/>
+        </p:nvSpPr>
+        <p:spPr>
+          <a:xfrm>
+            <a:off x="4899547" y="6042026"/>
+            <a:ext cx="2047164" cy="369332"/>
+          </a:xfrm>
+          <a:prstGeom prst="rect">
+            <a:avLst/>
+          </a:prstGeom>
+          <a:noFill/>
+        </p:spPr>
+        <p:txBody>
+          <a:bodyPr wrap="square" rtlCol="0">
+            <a:spAutoFit/>
+          </a:bodyPr>
+          <a:lstStyle/>
+          <a:p>
+            <a:r>
+              <a:rPr lang="fr-FR" dirty="0"/>
+              <a:t>Architecture 3 tiers</a:t>
+            </a:r>
+          </a:p>
+        </p:txBody>
+      </p:sp>
+    </p:spTree>
+    <p:extLst>
+      <p:ext uri="{BB962C8B-B14F-4D97-AF65-F5344CB8AC3E}">
+        <p14:creationId xmlns:p14="http://schemas.microsoft.com/office/powerpoint/2010/main" val="2930943715"/>
+      </p:ext>
+    </p:extLst>
+  </p:cSld>
+  <p:clrMapOvr>
+    <a:masterClrMapping/>
+  </p:clrMapOvr>
+  <p:transition spd="med">
+    <p:pull/>
+  </p:transition>
+</p:sld>
+</file>
+
+<file path=ppt/slides/slide14.xml><?xml version="1.0" encoding="utf-8"?>
+<p:sld xmlns:a="http://schemas.openxmlformats.org/drawingml/2006/main" xmlns:r="http://schemas.openxmlformats.org/officeDocument/2006/relationships" xmlns:p="http://schemas.openxmlformats.org/presentationml/2006/main">
+  <p:cSld>
+    <p:spTree>
+      <p:nvGrpSpPr>
+        <p:cNvPr id="1" name=""/>
+        <p:cNvGrpSpPr/>
+        <p:nvPr/>
+      </p:nvGrpSpPr>
+      <p:grpSpPr>
+        <a:xfrm>
+          <a:off x="0" y="0"/>
+          <a:ext cx="0" cy="0"/>
+          <a:chOff x="0" y="0"/>
+          <a:chExt cx="0" cy="0"/>
+        </a:xfrm>
+      </p:grpSpPr>
+      <p:sp>
+        <p:nvSpPr>
+          <p:cNvPr id="2" name="Titre 1">
+            <a:extLst>
+              <a:ext uri="{FF2B5EF4-FFF2-40B4-BE49-F238E27FC236}">
+                <a16:creationId xmlns:a16="http://schemas.microsoft.com/office/drawing/2014/main" id="{8781D65F-EA15-4A32-AF33-DC5AE8F09BFB}"/>
+              </a:ext>
+            </a:extLst>
+          </p:cNvPr>
+          <p:cNvSpPr>
+            <a:spLocks noGrp="1"/>
+          </p:cNvSpPr>
+          <p:nvPr>
+            <p:ph type="title"/>
+          </p:nvPr>
+        </p:nvSpPr>
+        <p:spPr/>
+        <p:txBody>
+          <a:bodyPr/>
+          <a:lstStyle/>
+          <a:p>
+            <a:pPr algn="ctr"/>
+            <a:r>
+              <a:rPr lang="fr-FR" dirty="0"/>
+              <a:t>Contexte technique organisationnelle</a:t>
+            </a:r>
+          </a:p>
+        </p:txBody>
+      </p:sp>
+      <p:pic>
+        <p:nvPicPr>
+          <p:cNvPr id="4" name="Espace réservé du contenu 3" descr="https://lh5.googleusercontent.com/RfzrRO813z7nFrxkRvHgzjRM5W0iiim2uyWeN2H5ifc7hln1dM_loL7cqb95Q585B8kKFEHPKyCJdfkPQ-iuG-NguZyUcDezRb33kjDCt7_YZkNnkFETcBfeKDEOthrGLrdjsfgu">
+            <a:extLst>
+              <a:ext uri="{FF2B5EF4-FFF2-40B4-BE49-F238E27FC236}">
+                <a16:creationId xmlns:a16="http://schemas.microsoft.com/office/drawing/2014/main" id="{8DA4B179-C0EF-4734-9756-A48ED415863C}"/>
+              </a:ext>
+            </a:extLst>
+          </p:cNvPr>
+          <p:cNvPicPr>
+            <a:picLocks noGrp="1"/>
+          </p:cNvPicPr>
+          <p:nvPr>
+            <p:ph idx="1"/>
+          </p:nvPr>
+        </p:nvPicPr>
+        <p:blipFill>
+          <a:blip r:embed="rId2">
+            <a:extLst>
+              <a:ext uri="{28A0092B-C50C-407E-A947-70E740481C1C}">
+                <a14:useLocalDpi xmlns:a14="http://schemas.microsoft.com/office/drawing/2010/main" val="0"/>
+              </a:ext>
+            </a:extLst>
+          </a:blip>
+          <a:srcRect/>
+          <a:stretch>
+            <a:fillRect/>
+          </a:stretch>
+        </p:blipFill>
+        <p:spPr bwMode="auto">
+          <a:xfrm>
+            <a:off x="1824727" y="1825625"/>
+            <a:ext cx="8542546" cy="4351338"/>
+          </a:xfrm>
+          <a:prstGeom prst="rect">
+            <a:avLst/>
+          </a:prstGeom>
+          <a:noFill/>
+          <a:ln>
+            <a:noFill/>
+          </a:ln>
+        </p:spPr>
+      </p:pic>
+      <p:sp>
+        <p:nvSpPr>
+          <p:cNvPr id="5" name="ZoneTexte 4">
+            <a:extLst>
+              <a:ext uri="{FF2B5EF4-FFF2-40B4-BE49-F238E27FC236}">
+                <a16:creationId xmlns:a16="http://schemas.microsoft.com/office/drawing/2014/main" id="{3D93AD27-FA6A-43CB-8C2B-A3738D5AFD47}"/>
+              </a:ext>
+            </a:extLst>
+          </p:cNvPr>
+          <p:cNvSpPr txBox="1"/>
+          <p:nvPr/>
+        </p:nvSpPr>
+        <p:spPr>
+          <a:xfrm>
+            <a:off x="5008728" y="5942568"/>
+            <a:ext cx="2729552" cy="369332"/>
+          </a:xfrm>
+          <a:prstGeom prst="rect">
+            <a:avLst/>
+          </a:prstGeom>
+          <a:noFill/>
+        </p:spPr>
+        <p:txBody>
+          <a:bodyPr wrap="square" rtlCol="0">
+            <a:spAutoFit/>
+          </a:bodyPr>
+          <a:lstStyle/>
+          <a:p>
+            <a:r>
+              <a:rPr lang="fr-FR" dirty="0"/>
+              <a:t>Modèle MVC2</a:t>
+            </a:r>
+          </a:p>
+        </p:txBody>
+      </p:sp>
+    </p:spTree>
+    <p:extLst>
+      <p:ext uri="{BB962C8B-B14F-4D97-AF65-F5344CB8AC3E}">
+        <p14:creationId xmlns:p14="http://schemas.microsoft.com/office/powerpoint/2010/main" val="2654510945"/>
+      </p:ext>
+    </p:extLst>
+  </p:cSld>
+  <p:clrMapOvr>
+    <a:masterClrMapping/>
+  </p:clrMapOvr>
+  <mc:AlternateContent xmlns:mc="http://schemas.openxmlformats.org/markup-compatibility/2006">
+    <mc:Choice xmlns:p14="http://schemas.microsoft.com/office/powerpoint/2010/main" Requires="p14">
+      <p:transition spd="med" p14:dur="700">
+        <p:fade/>
+      </p:transition>
+    </mc:Choice>
+    <mc:Fallback>
+      <p:transition spd="med">
+        <p:fade/>
+      </p:transition>
+    </mc:Fallback>
+  </mc:AlternateContent>
+</p:sld>
+</file>
+
+<file path=ppt/slides/slide15.xml><?xml version="1.0" encoding="utf-8"?>
+<p:sld xmlns:a="http://schemas.openxmlformats.org/drawingml/2006/main" xmlns:r="http://schemas.openxmlformats.org/officeDocument/2006/relationships" xmlns:p="http://schemas.openxmlformats.org/presentationml/2006/main">
+  <p:cSld>
+    <p:spTree>
+      <p:nvGrpSpPr>
+        <p:cNvPr id="1" name=""/>
+        <p:cNvGrpSpPr/>
+        <p:nvPr/>
+      </p:nvGrpSpPr>
+      <p:grpSpPr>
+        <a:xfrm>
+          <a:off x="0" y="0"/>
+          <a:ext cx="0" cy="0"/>
+          <a:chOff x="0" y="0"/>
+          <a:chExt cx="0" cy="0"/>
+        </a:xfrm>
+      </p:grpSpPr>
+      <p:sp>
+        <p:nvSpPr>
+          <p:cNvPr id="2" name="Titre 1">
+            <a:extLst>
+              <a:ext uri="{FF2B5EF4-FFF2-40B4-BE49-F238E27FC236}">
+                <a16:creationId xmlns:a16="http://schemas.microsoft.com/office/drawing/2014/main" id="{10D3A23D-6B62-4138-BF08-CF664033E6D3}"/>
+              </a:ext>
+            </a:extLst>
+          </p:cNvPr>
+          <p:cNvSpPr>
+            <a:spLocks noGrp="1"/>
+          </p:cNvSpPr>
+          <p:nvPr>
+            <p:ph type="title"/>
+          </p:nvPr>
+        </p:nvSpPr>
+        <p:spPr/>
+        <p:txBody>
+          <a:bodyPr/>
+          <a:lstStyle/>
+          <a:p>
+            <a:pPr algn="ctr"/>
+            <a:r>
+              <a:rPr lang="fr-FR" dirty="0"/>
+              <a:t>Contexte technique organisationnelle</a:t>
+            </a:r>
+          </a:p>
+        </p:txBody>
+      </p:sp>
+      <p:sp>
+        <p:nvSpPr>
+          <p:cNvPr id="3" name="Espace réservé du contenu 2">
+            <a:extLst>
+              <a:ext uri="{FF2B5EF4-FFF2-40B4-BE49-F238E27FC236}">
+                <a16:creationId xmlns:a16="http://schemas.microsoft.com/office/drawing/2014/main" id="{F4C9DB6B-6767-41D6-9649-3128C8E6AB89}"/>
+              </a:ext>
+            </a:extLst>
+          </p:cNvPr>
+          <p:cNvSpPr>
+            <a:spLocks noGrp="1"/>
+          </p:cNvSpPr>
+          <p:nvPr>
+            <p:ph idx="1"/>
+          </p:nvPr>
+        </p:nvSpPr>
+        <p:spPr/>
+        <p:txBody>
+          <a:bodyPr/>
+          <a:lstStyle/>
+          <a:p>
+            <a:endParaRPr lang="fr-FR" dirty="0"/>
+          </a:p>
+          <a:p>
+            <a:r>
+              <a:rPr lang="fr-FR" dirty="0"/>
+              <a:t>Conception et mise en place du modèle</a:t>
+            </a:r>
+          </a:p>
+          <a:p>
+            <a:endParaRPr lang="fr-FR" dirty="0"/>
+          </a:p>
+          <a:p>
+            <a:endParaRPr lang="fr-FR" dirty="0"/>
+          </a:p>
+          <a:p>
+            <a:endParaRPr lang="fr-FR" dirty="0"/>
+          </a:p>
+          <a:p>
+            <a:endParaRPr lang="fr-FR" dirty="0"/>
+          </a:p>
+          <a:p>
+            <a:r>
+              <a:rPr lang="fr-FR" dirty="0"/>
+              <a:t>Développement du contenu, de la vue et de l’interface</a:t>
+            </a:r>
+          </a:p>
+        </p:txBody>
+      </p:sp>
+      <p:pic>
+        <p:nvPicPr>
+          <p:cNvPr id="5" name="Image 4">
+            <a:extLst>
+              <a:ext uri="{FF2B5EF4-FFF2-40B4-BE49-F238E27FC236}">
+                <a16:creationId xmlns:a16="http://schemas.microsoft.com/office/drawing/2014/main" id="{A4880DF2-E57A-44E8-BA18-509A2DAA1BC8}"/>
+              </a:ext>
+            </a:extLst>
+          </p:cNvPr>
+          <p:cNvPicPr>
+            <a:picLocks noChangeAspect="1"/>
+          </p:cNvPicPr>
+          <p:nvPr/>
+        </p:nvPicPr>
+        <p:blipFill>
+          <a:blip r:embed="rId2">
+            <a:extLst>
+              <a:ext uri="{28A0092B-C50C-407E-A947-70E740481C1C}">
+                <a14:useLocalDpi xmlns:a14="http://schemas.microsoft.com/office/drawing/2010/main" val="0"/>
+              </a:ext>
+            </a:extLst>
+          </a:blip>
+          <a:stretch>
+            <a:fillRect/>
+          </a:stretch>
+        </p:blipFill>
+        <p:spPr>
+          <a:xfrm>
+            <a:off x="7295226" y="1825625"/>
+            <a:ext cx="4058574" cy="2992035"/>
+          </a:xfrm>
+          <a:prstGeom prst="rect">
+            <a:avLst/>
+          </a:prstGeom>
+        </p:spPr>
+      </p:pic>
+    </p:spTree>
+    <p:extLst>
+      <p:ext uri="{BB962C8B-B14F-4D97-AF65-F5344CB8AC3E}">
+        <p14:creationId xmlns:p14="http://schemas.microsoft.com/office/powerpoint/2010/main" val="3609890374"/>
+      </p:ext>
+    </p:extLst>
+  </p:cSld>
+  <p:clrMapOvr>
+    <a:masterClrMapping/>
+  </p:clrMapOvr>
+  <mc:AlternateContent xmlns:mc="http://schemas.openxmlformats.org/markup-compatibility/2006">
+    <mc:Choice xmlns:p14="http://schemas.microsoft.com/office/powerpoint/2010/main" Requires="p14">
+      <p:transition spd="med" p14:dur="700">
+        <p:fade/>
+      </p:transition>
+    </mc:Choice>
+    <mc:Fallback>
+      <p:transition spd="med">
+        <p:fade/>
+      </p:transition>
+    </mc:Fallback>
+  </mc:AlternateContent>
+</p:sld>
+</file>
+
+<file path=ppt/slides/slide16.xml><?xml version="1.0" encoding="utf-8"?>
+<p:sld xmlns:a="http://schemas.openxmlformats.org/drawingml/2006/main" xmlns:r="http://schemas.openxmlformats.org/officeDocument/2006/relationships" xmlns:p="http://schemas.openxmlformats.org/presentationml/2006/main">
+  <p:cSld>
+    <p:spTree>
+      <p:nvGrpSpPr>
+        <p:cNvPr id="1" name=""/>
+        <p:cNvGrpSpPr/>
+        <p:nvPr/>
+      </p:nvGrpSpPr>
+      <p:grpSpPr>
+        <a:xfrm>
+          <a:off x="0" y="0"/>
+          <a:ext cx="0" cy="0"/>
+          <a:chOff x="0" y="0"/>
+          <a:chExt cx="0" cy="0"/>
+        </a:xfrm>
+      </p:grpSpPr>
+      <p:sp>
+        <p:nvSpPr>
+          <p:cNvPr id="2" name="Titre 1">
+            <a:extLst>
+              <a:ext uri="{FF2B5EF4-FFF2-40B4-BE49-F238E27FC236}">
+                <a16:creationId xmlns:a16="http://schemas.microsoft.com/office/drawing/2014/main" id="{BD02D718-1D53-4534-833A-08F45EEA5F33}"/>
+              </a:ext>
+            </a:extLst>
+          </p:cNvPr>
+          <p:cNvSpPr>
+            <a:spLocks noGrp="1"/>
+          </p:cNvSpPr>
+          <p:nvPr>
+            <p:ph type="ctrTitle"/>
+          </p:nvPr>
+        </p:nvSpPr>
+        <p:spPr>
+          <a:xfrm>
+            <a:off x="1715069" y="2879677"/>
+            <a:ext cx="9144000" cy="955341"/>
+          </a:xfrm>
+        </p:spPr>
+        <p:txBody>
+          <a:bodyPr/>
+          <a:lstStyle/>
+          <a:p>
+            <a:r>
+              <a:rPr lang="fr-FR" dirty="0"/>
+              <a:t>Analyse du projet</a:t>
+            </a:r>
+          </a:p>
+        </p:txBody>
+      </p:sp>
+    </p:spTree>
+    <p:extLst>
+      <p:ext uri="{BB962C8B-B14F-4D97-AF65-F5344CB8AC3E}">
+        <p14:creationId xmlns:p14="http://schemas.microsoft.com/office/powerpoint/2010/main" val="3094070553"/>
+      </p:ext>
+    </p:extLst>
+  </p:cSld>
+  <p:clrMapOvr>
+    <a:masterClrMapping/>
+  </p:clrMapOvr>
+  <p:transition spd="slow">
+    <p:push dir="u"/>
+  </p:transition>
+</p:sld>
+</file>
+
+<file path=ppt/slides/slide17.xml><?xml version="1.0" encoding="utf-8"?>
+<p:sld xmlns:a="http://schemas.openxmlformats.org/drawingml/2006/main" xmlns:r="http://schemas.openxmlformats.org/officeDocument/2006/relationships" xmlns:p="http://schemas.openxmlformats.org/presentationml/2006/main">
+  <p:cSld>
+    <p:spTree>
+      <p:nvGrpSpPr>
+        <p:cNvPr id="1" name=""/>
+        <p:cNvGrpSpPr/>
+        <p:nvPr/>
+      </p:nvGrpSpPr>
+      <p:grpSpPr>
+        <a:xfrm>
+          <a:off x="0" y="0"/>
+          <a:ext cx="0" cy="0"/>
+          <a:chOff x="0" y="0"/>
+          <a:chExt cx="0" cy="0"/>
+        </a:xfrm>
+      </p:grpSpPr>
+      <p:sp>
+        <p:nvSpPr>
+          <p:cNvPr id="2" name="Titre 1">
+            <a:extLst>
+              <a:ext uri="{FF2B5EF4-FFF2-40B4-BE49-F238E27FC236}">
+                <a16:creationId xmlns:a16="http://schemas.microsoft.com/office/drawing/2014/main" id="{890211E6-3AA7-4B89-9C28-36E22A458E43}"/>
+              </a:ext>
+            </a:extLst>
+          </p:cNvPr>
+          <p:cNvSpPr>
+            <a:spLocks noGrp="1"/>
+          </p:cNvSpPr>
+          <p:nvPr>
+            <p:ph type="title"/>
+          </p:nvPr>
+        </p:nvSpPr>
+        <p:spPr/>
+        <p:txBody>
+          <a:bodyPr/>
+          <a:lstStyle/>
+          <a:p>
+            <a:pPr algn="ctr"/>
+            <a:r>
+              <a:rPr lang="fr-FR" dirty="0"/>
+              <a:t>Use Case</a:t>
+            </a:r>
+          </a:p>
+        </p:txBody>
+      </p:sp>
+      <p:pic>
+        <p:nvPicPr>
+          <p:cNvPr id="4" name="Espace réservé du contenu 5">
+            <a:extLst>
+              <a:ext uri="{FF2B5EF4-FFF2-40B4-BE49-F238E27FC236}">
+                <a16:creationId xmlns:a16="http://schemas.microsoft.com/office/drawing/2014/main" id="{63AA2886-0DA7-4584-B6D1-D0532942CC2F}"/>
+              </a:ext>
+            </a:extLst>
+          </p:cNvPr>
+          <p:cNvPicPr>
+            <a:picLocks noGrp="1"/>
+          </p:cNvPicPr>
+          <p:nvPr>
+            <p:ph idx="1"/>
+          </p:nvPr>
+        </p:nvPicPr>
+        <p:blipFill>
+          <a:blip r:embed="rId2">
+            <a:extLst>
+              <a:ext uri="{28A0092B-C50C-407E-A947-70E740481C1C}">
+                <a14:useLocalDpi xmlns:a14="http://schemas.microsoft.com/office/drawing/2010/main" val="0"/>
+              </a:ext>
+            </a:extLst>
+          </a:blip>
+          <a:stretch>
+            <a:fillRect/>
+          </a:stretch>
+        </p:blipFill>
+        <p:spPr>
+          <a:xfrm>
+            <a:off x="2714165" y="1690688"/>
+            <a:ext cx="6763670" cy="4300679"/>
+          </a:xfrm>
+          <a:prstGeom prst="rect">
+            <a:avLst/>
+          </a:prstGeom>
+        </p:spPr>
+      </p:pic>
+    </p:spTree>
+    <p:extLst>
+      <p:ext uri="{BB962C8B-B14F-4D97-AF65-F5344CB8AC3E}">
+        <p14:creationId xmlns:p14="http://schemas.microsoft.com/office/powerpoint/2010/main" val="4228241051"/>
+      </p:ext>
+    </p:extLst>
+  </p:cSld>
+  <p:clrMapOvr>
+    <a:masterClrMapping/>
+  </p:clrMapOvr>
+  <p:transition spd="med">
+    <p:pull/>
+  </p:transition>
+</p:sld>
+</file>
+
+<file path=ppt/slides/slide18.xml><?xml version="1.0" encoding="utf-8"?>
+<p:sld xmlns:a="http://schemas.openxmlformats.org/drawingml/2006/main" xmlns:r="http://schemas.openxmlformats.org/officeDocument/2006/relationships" xmlns:p="http://schemas.openxmlformats.org/presentationml/2006/main">
+  <p:cSld>
+    <p:spTree>
+      <p:nvGrpSpPr>
+        <p:cNvPr id="1" name=""/>
+        <p:cNvGrpSpPr/>
+        <p:nvPr/>
+      </p:nvGrpSpPr>
+      <p:grpSpPr>
+        <a:xfrm>
+          <a:off x="0" y="0"/>
+          <a:ext cx="0" cy="0"/>
+          <a:chOff x="0" y="0"/>
+          <a:chExt cx="0" cy="0"/>
+        </a:xfrm>
+      </p:grpSpPr>
+      <p:sp>
+        <p:nvSpPr>
+          <p:cNvPr id="2" name="Titre 1">
+            <a:extLst>
+              <a:ext uri="{FF2B5EF4-FFF2-40B4-BE49-F238E27FC236}">
+                <a16:creationId xmlns:a16="http://schemas.microsoft.com/office/drawing/2014/main" id="{679CA3D3-38E2-473C-BBC9-A1908814D5E7}"/>
+              </a:ext>
+            </a:extLst>
+          </p:cNvPr>
+          <p:cNvSpPr>
+            <a:spLocks noGrp="1"/>
+          </p:cNvSpPr>
+          <p:nvPr>
+            <p:ph type="title"/>
+          </p:nvPr>
+        </p:nvSpPr>
+        <p:spPr/>
+        <p:txBody>
+          <a:bodyPr/>
+          <a:lstStyle/>
+          <a:p>
+            <a:pPr algn="ctr"/>
+            <a:r>
+              <a:rPr lang="fr-FR" dirty="0"/>
+              <a:t>MCD</a:t>
+            </a:r>
+          </a:p>
+        </p:txBody>
+      </p:sp>
+      <p:pic>
+        <p:nvPicPr>
+          <p:cNvPr id="4" name="Espace réservé du contenu 3">
+            <a:extLst>
+              <a:ext uri="{FF2B5EF4-FFF2-40B4-BE49-F238E27FC236}">
+                <a16:creationId xmlns:a16="http://schemas.microsoft.com/office/drawing/2014/main" id="{BA75DB2A-F131-4E99-90CE-F694BADF42BE}"/>
+              </a:ext>
+            </a:extLst>
+          </p:cNvPr>
+          <p:cNvPicPr>
+            <a:picLocks noGrp="1"/>
+          </p:cNvPicPr>
+          <p:nvPr>
+            <p:ph idx="1"/>
+          </p:nvPr>
+        </p:nvPicPr>
+        <p:blipFill>
+          <a:blip r:embed="rId2">
+            <a:extLst>
+              <a:ext uri="{28A0092B-C50C-407E-A947-70E740481C1C}">
+                <a14:useLocalDpi xmlns:a14="http://schemas.microsoft.com/office/drawing/2010/main" val="0"/>
+              </a:ext>
+            </a:extLst>
+          </a:blip>
+          <a:stretch>
+            <a:fillRect/>
+          </a:stretch>
+        </p:blipFill>
+        <p:spPr>
+          <a:xfrm>
+            <a:off x="2028257" y="1690688"/>
+            <a:ext cx="8135485" cy="4039164"/>
+          </a:xfrm>
+          <a:prstGeom prst="rect">
+            <a:avLst/>
+          </a:prstGeom>
+        </p:spPr>
+      </p:pic>
+    </p:spTree>
+    <p:extLst>
+      <p:ext uri="{BB962C8B-B14F-4D97-AF65-F5344CB8AC3E}">
+        <p14:creationId xmlns:p14="http://schemas.microsoft.com/office/powerpoint/2010/main" val="1878670816"/>
+      </p:ext>
+    </p:extLst>
+  </p:cSld>
+  <p:clrMapOvr>
+    <a:masterClrMapping/>
+  </p:clrMapOvr>
+  <p:transition spd="med">
+    <p:pull/>
+  </p:transition>
+</p:sld>
+</file>
+
+<file path=ppt/slides/slide19.xml><?xml version="1.0" encoding="utf-8"?>
+<p:sld xmlns:a="http://schemas.openxmlformats.org/drawingml/2006/main" xmlns:r="http://schemas.openxmlformats.org/officeDocument/2006/relationships" xmlns:p="http://schemas.openxmlformats.org/presentationml/2006/main">
+  <p:cSld>
+    <p:spTree>
+      <p:nvGrpSpPr>
+        <p:cNvPr id="1" name=""/>
+        <p:cNvGrpSpPr/>
+        <p:nvPr/>
+      </p:nvGrpSpPr>
+      <p:grpSpPr>
+        <a:xfrm>
+          <a:off x="0" y="0"/>
+          <a:ext cx="0" cy="0"/>
+          <a:chOff x="0" y="0"/>
+          <a:chExt cx="0" cy="0"/>
+        </a:xfrm>
+      </p:grpSpPr>
+      <p:sp>
+        <p:nvSpPr>
+          <p:cNvPr id="2" name="Titre 1">
+            <a:extLst>
+              <a:ext uri="{FF2B5EF4-FFF2-40B4-BE49-F238E27FC236}">
+                <a16:creationId xmlns:a16="http://schemas.microsoft.com/office/drawing/2014/main" id="{1FC61E82-F0CC-4C18-9D11-158843E970F2}"/>
+              </a:ext>
+            </a:extLst>
+          </p:cNvPr>
+          <p:cNvSpPr>
+            <a:spLocks noGrp="1"/>
+          </p:cNvSpPr>
+          <p:nvPr>
+            <p:ph type="title"/>
+          </p:nvPr>
+        </p:nvSpPr>
+        <p:spPr/>
+        <p:txBody>
+          <a:bodyPr/>
+          <a:lstStyle/>
+          <a:p>
+            <a:pPr algn="ctr"/>
+            <a:r>
+              <a:rPr lang="fr-FR" dirty="0"/>
+              <a:t>MLD</a:t>
+            </a:r>
+          </a:p>
+        </p:txBody>
+      </p:sp>
+      <p:pic>
+        <p:nvPicPr>
+          <p:cNvPr id="4" name="Espace réservé du contenu 3">
+            <a:extLst>
+              <a:ext uri="{FF2B5EF4-FFF2-40B4-BE49-F238E27FC236}">
+                <a16:creationId xmlns:a16="http://schemas.microsoft.com/office/drawing/2014/main" id="{55C0F20B-4F7A-4062-B4DD-BB2BD95658C8}"/>
+              </a:ext>
+            </a:extLst>
+          </p:cNvPr>
+          <p:cNvPicPr>
+            <a:picLocks noGrp="1"/>
+          </p:cNvPicPr>
+          <p:nvPr>
+            <p:ph idx="1"/>
+          </p:nvPr>
+        </p:nvPicPr>
+        <p:blipFill>
+          <a:blip r:embed="rId2">
+            <a:extLst>
+              <a:ext uri="{28A0092B-C50C-407E-A947-70E740481C1C}">
+                <a14:useLocalDpi xmlns:a14="http://schemas.microsoft.com/office/drawing/2010/main" val="0"/>
+              </a:ext>
+            </a:extLst>
+          </a:blip>
+          <a:stretch>
+            <a:fillRect/>
+          </a:stretch>
+        </p:blipFill>
+        <p:spPr>
+          <a:xfrm>
+            <a:off x="2129155" y="1690688"/>
+            <a:ext cx="7933689" cy="4351338"/>
+          </a:xfrm>
+          <a:prstGeom prst="rect">
+            <a:avLst/>
+          </a:prstGeom>
+        </p:spPr>
+      </p:pic>
+    </p:spTree>
+    <p:extLst>
+      <p:ext uri="{BB962C8B-B14F-4D97-AF65-F5344CB8AC3E}">
+        <p14:creationId xmlns:p14="http://schemas.microsoft.com/office/powerpoint/2010/main" val="2759752472"/>
+      </p:ext>
+    </p:extLst>
+  </p:cSld>
+  <p:clrMapOvr>
+    <a:masterClrMapping/>
+  </p:clrMapOvr>
+  <p:transition spd="med">
+    <p:pull/>
+  </p:transition>
 </p:sld>
 </file>
 
@@ -3593,6 +5045,7 @@
           <a:bodyPr/>
           <a:lstStyle/>
           <a:p>
+            <a:pPr algn="ctr"/>
             <a:r>
               <a:rPr lang="fr-FR" dirty="0"/>
               <a:t>Sommaire</a:t>
@@ -3623,81 +5076,108 @@
           </a:bodyPr>
           <a:lstStyle/>
           <a:p>
+            <a:pPr marL="0" indent="0">
+              <a:buNone/>
+            </a:pPr>
             <a:r>
               <a:rPr lang="fr-FR" sz="2400" dirty="0"/>
               <a:t>Présentation</a:t>
             </a:r>
           </a:p>
           <a:p>
-            <a:pPr lvl="1"/>
+            <a:pPr marL="457200" lvl="1" indent="0">
+              <a:buNone/>
+            </a:pPr>
             <a:r>
               <a:rPr lang="fr-FR" sz="2000" dirty="0"/>
               <a:t>Contexte</a:t>
             </a:r>
           </a:p>
           <a:p>
-            <a:pPr lvl="1"/>
+            <a:pPr marL="457200" lvl="1" indent="0">
+              <a:buNone/>
+            </a:pPr>
             <a:r>
               <a:rPr lang="fr-FR" sz="2000" dirty="0"/>
               <a:t>Cibles</a:t>
             </a:r>
           </a:p>
           <a:p>
-            <a:pPr lvl="1"/>
+            <a:pPr marL="457200" lvl="1" indent="0">
+              <a:buNone/>
+            </a:pPr>
             <a:r>
               <a:rPr lang="fr-FR" sz="2000" dirty="0"/>
               <a:t>Objectifs</a:t>
             </a:r>
           </a:p>
           <a:p>
-            <a:pPr lvl="1"/>
+            <a:pPr marL="457200" lvl="1" indent="0">
+              <a:buNone/>
+            </a:pPr>
             <a:r>
               <a:rPr lang="fr-FR" sz="2000" dirty="0"/>
               <a:t>Existant</a:t>
             </a:r>
           </a:p>
           <a:p>
+            <a:pPr marL="0" indent="0">
+              <a:buNone/>
+            </a:pPr>
             <a:r>
               <a:rPr lang="fr-FR" sz="2400" dirty="0"/>
               <a:t>Aspects fonctionnels et techniques</a:t>
             </a:r>
           </a:p>
           <a:p>
-            <a:pPr lvl="1"/>
+            <a:pPr marL="457200" lvl="1" indent="0">
+              <a:buNone/>
+            </a:pPr>
             <a:r>
               <a:rPr lang="fr-FR" sz="2000" dirty="0"/>
               <a:t>Arborescence du site</a:t>
             </a:r>
           </a:p>
           <a:p>
-            <a:pPr lvl="1"/>
+            <a:pPr marL="457200" lvl="1" indent="0">
+              <a:buNone/>
+            </a:pPr>
             <a:r>
               <a:rPr lang="fr-FR" sz="2000" dirty="0"/>
               <a:t>Spécifications fonctionnels</a:t>
             </a:r>
           </a:p>
           <a:p>
-            <a:pPr lvl="1"/>
+            <a:pPr marL="457200" lvl="1" indent="0">
+              <a:buNone/>
+            </a:pPr>
             <a:r>
               <a:rPr lang="fr-FR" sz="2000" dirty="0"/>
               <a:t>Spécifications techniques</a:t>
             </a:r>
           </a:p>
           <a:p>
-            <a:pPr lvl="1"/>
+            <a:pPr marL="457200" lvl="1" indent="0">
+              <a:buNone/>
+            </a:pPr>
             <a:r>
               <a:rPr lang="fr-FR" sz="2000" dirty="0"/>
-              <a:t>Contexte techniques organisationnelles</a:t>
-            </a:r>
-          </a:p>
-          <a:p>
+              <a:t>Contexte technique organisationnelle</a:t>
+            </a:r>
+          </a:p>
+          <a:p>
+            <a:pPr marL="0" indent="0">
+              <a:buNone/>
+            </a:pPr>
             <a:r>
               <a:rPr lang="fr-FR" sz="2400" dirty="0"/>
               <a:t>Analyse du projet</a:t>
             </a:r>
           </a:p>
           <a:p>
-            <a:pPr lvl="1"/>
+            <a:pPr marL="457200" lvl="1" indent="0">
+              <a:buNone/>
+            </a:pPr>
             <a:r>
               <a:rPr lang="fr-FR" sz="2000" dirty="0"/>
               <a:t>Diagrammes</a:t>
@@ -3715,6 +5195,86 @@
   <p:clrMapOvr>
     <a:masterClrMapping/>
   </p:clrMapOvr>
+  <p:transition spd="med">
+    <p:pull/>
+  </p:transition>
+</p:sld>
+</file>
+
+<file path=ppt/slides/slide20.xml><?xml version="1.0" encoding="utf-8"?>
+<p:sld xmlns:a="http://schemas.openxmlformats.org/drawingml/2006/main" xmlns:r="http://schemas.openxmlformats.org/officeDocument/2006/relationships" xmlns:p="http://schemas.openxmlformats.org/presentationml/2006/main">
+  <p:cSld>
+    <p:spTree>
+      <p:nvGrpSpPr>
+        <p:cNvPr id="1" name=""/>
+        <p:cNvGrpSpPr/>
+        <p:nvPr/>
+      </p:nvGrpSpPr>
+      <p:grpSpPr>
+        <a:xfrm>
+          <a:off x="0" y="0"/>
+          <a:ext cx="0" cy="0"/>
+          <a:chOff x="0" y="0"/>
+          <a:chExt cx="0" cy="0"/>
+        </a:xfrm>
+      </p:grpSpPr>
+      <p:pic>
+        <p:nvPicPr>
+          <p:cNvPr id="7" name="Espace réservé du contenu 6">
+            <a:extLst>
+              <a:ext uri="{FF2B5EF4-FFF2-40B4-BE49-F238E27FC236}">
+                <a16:creationId xmlns:a16="http://schemas.microsoft.com/office/drawing/2014/main" id="{DA913018-F38E-43DE-8C96-B71E8154B542}"/>
+              </a:ext>
+            </a:extLst>
+          </p:cNvPr>
+          <p:cNvPicPr>
+            <a:picLocks noGrp="1" noChangeAspect="1"/>
+          </p:cNvPicPr>
+          <p:nvPr>
+            <p:ph idx="1"/>
+          </p:nvPr>
+        </p:nvPicPr>
+        <p:blipFill>
+          <a:blip r:embed="rId2">
+            <a:extLst>
+              <a:ext uri="{28A0092B-C50C-407E-A947-70E740481C1C}">
+                <a14:useLocalDpi xmlns:a14="http://schemas.microsoft.com/office/drawing/2010/main" val="0"/>
+              </a:ext>
+            </a:extLst>
+          </a:blip>
+          <a:stretch>
+            <a:fillRect/>
+          </a:stretch>
+        </p:blipFill>
+        <p:spPr>
+          <a:xfrm>
+            <a:off x="4493026" y="1289938"/>
+            <a:ext cx="3205948" cy="4073631"/>
+          </a:xfrm>
+        </p:spPr>
+      </p:pic>
+    </p:spTree>
+    <p:extLst>
+      <p:ext uri="{BB962C8B-B14F-4D97-AF65-F5344CB8AC3E}">
+        <p14:creationId xmlns:p14="http://schemas.microsoft.com/office/powerpoint/2010/main" val="4011992083"/>
+      </p:ext>
+    </p:extLst>
+  </p:cSld>
+  <p:clrMapOvr>
+    <a:masterClrMapping/>
+  </p:clrMapOvr>
+  <mc:AlternateContent xmlns:mc="http://schemas.openxmlformats.org/markup-compatibility/2006">
+    <mc:Choice xmlns:p14="http://schemas.microsoft.com/office/powerpoint/2010/main" Requires="p14">
+      <p:transition spd="slow" p14:dur="800">
+        <p:circle/>
+      </p:transition>
+    </mc:Choice>
+    <mc:Fallback>
+      <p:transition spd="slow">
+        <p:circle/>
+      </p:transition>
+    </mc:Fallback>
+  </mc:AlternateContent>
 </p:sld>
 </file>
 
@@ -3756,6 +5316,7 @@
           <a:bodyPr/>
           <a:lstStyle/>
           <a:p>
+            <a:pPr algn="ctr"/>
             <a:r>
               <a:rPr lang="fr-FR" dirty="0"/>
               <a:t>Présentation</a:t>
@@ -3779,7 +5340,12 @@
             <p:ph idx="1"/>
           </p:nvPr>
         </p:nvSpPr>
-        <p:spPr/>
+        <p:spPr>
+          <a:xfrm>
+            <a:off x="838200" y="1811977"/>
+            <a:ext cx="10515600" cy="4351338"/>
+          </a:xfrm>
+        </p:spPr>
         <p:txBody>
           <a:bodyPr/>
           <a:lstStyle/>
@@ -3882,6 +5448,9 @@
   <p:clrMapOvr>
     <a:masterClrMapping/>
   </p:clrMapOvr>
+  <p:transition spd="med">
+    <p:pull/>
+  </p:transition>
 </p:sld>
 </file>
 
@@ -3923,6 +5492,7 @@
           <a:bodyPr/>
           <a:lstStyle/>
           <a:p>
+            <a:pPr algn="ctr"/>
             <a:r>
               <a:rPr lang="fr-FR" dirty="0"/>
               <a:t>Contexte</a:t>
@@ -3948,7 +5518,7 @@
         </p:nvSpPr>
         <p:spPr>
           <a:xfrm>
-            <a:off x="838200" y="1975750"/>
+            <a:off x="838200" y="1907510"/>
             <a:ext cx="10515600" cy="4351338"/>
           </a:xfrm>
         </p:spPr>
@@ -3978,10 +5548,9 @@
           </a:p>
           <a:p>
             <a:r>
-              <a:rPr lang="fr-FR" dirty="0" err="1"/>
-              <a:t>Indisponibilté</a:t>
-            </a:r>
-            <a:endParaRPr lang="fr-FR" dirty="0"/>
+              <a:rPr lang="fr-FR" dirty="0"/>
+              <a:t>Manque de visibilité</a:t>
+            </a:r>
           </a:p>
         </p:txBody>
       </p:sp>
@@ -4031,6 +5600,9 @@
   <p:clrMapOvr>
     <a:masterClrMapping/>
   </p:clrMapOvr>
+  <p:transition spd="med">
+    <p:pull/>
+  </p:transition>
 </p:sld>
 </file>
 
@@ -4072,6 +5644,7 @@
           <a:bodyPr/>
           <a:lstStyle/>
           <a:p>
+            <a:pPr algn="ctr"/>
             <a:r>
               <a:rPr lang="fr-FR" dirty="0"/>
               <a:t>Cibles</a:t>
@@ -4100,10 +5673,58 @@
           <a:bodyPr/>
           <a:lstStyle/>
           <a:p>
-            <a:endParaRPr lang="fr-FR"/>
-          </a:p>
-        </p:txBody>
-      </p:sp>
+            <a:endParaRPr lang="fr-FR" dirty="0"/>
+          </a:p>
+          <a:p>
+            <a:endParaRPr lang="fr-FR" dirty="0"/>
+          </a:p>
+          <a:p>
+            <a:endParaRPr lang="fr-FR" dirty="0"/>
+          </a:p>
+          <a:p>
+            <a:r>
+              <a:rPr lang="fr-FR" dirty="0"/>
+              <a:t>Clients des SCPI</a:t>
+            </a:r>
+          </a:p>
+        </p:txBody>
+      </p:sp>
+      <p:pic>
+        <p:nvPicPr>
+          <p:cNvPr id="7" name="Image 6">
+            <a:extLst>
+              <a:ext uri="{FF2B5EF4-FFF2-40B4-BE49-F238E27FC236}">
+                <a16:creationId xmlns:a16="http://schemas.microsoft.com/office/drawing/2014/main" id="{D37341AE-D4E9-469E-B315-6C42516502A8}"/>
+              </a:ext>
+            </a:extLst>
+          </p:cNvPr>
+          <p:cNvPicPr>
+            <a:picLocks noChangeAspect="1"/>
+          </p:cNvPicPr>
+          <p:nvPr/>
+        </p:nvPicPr>
+        <p:blipFill>
+          <a:blip r:embed="rId2">
+            <a:extLst>
+              <a:ext uri="{28A0092B-C50C-407E-A947-70E740481C1C}">
+                <a14:useLocalDpi xmlns:a14="http://schemas.microsoft.com/office/drawing/2010/main" val="0"/>
+              </a:ext>
+            </a:extLst>
+          </a:blip>
+          <a:stretch>
+            <a:fillRect/>
+          </a:stretch>
+        </p:blipFill>
+        <p:spPr>
+          <a:xfrm>
+            <a:off x="4817659" y="1825625"/>
+            <a:ext cx="5190699" cy="3462156"/>
+          </a:xfrm>
+          <a:prstGeom prst="rect">
+            <a:avLst/>
+          </a:prstGeom>
+        </p:spPr>
+      </p:pic>
     </p:spTree>
     <p:extLst>
       <p:ext uri="{BB962C8B-B14F-4D97-AF65-F5344CB8AC3E}">
@@ -4114,6 +5735,9 @@
   <p:clrMapOvr>
     <a:masterClrMapping/>
   </p:clrMapOvr>
+  <p:transition spd="med">
+    <p:pull/>
+  </p:transition>
 </p:sld>
 </file>
 
@@ -4155,6 +5779,7 @@
           <a:bodyPr/>
           <a:lstStyle/>
           <a:p>
+            <a:pPr algn="ctr"/>
             <a:r>
               <a:rPr lang="fr-FR" dirty="0"/>
               <a:t>Objectifs</a:t>
@@ -4183,10 +5808,67 @@
           <a:bodyPr/>
           <a:lstStyle/>
           <a:p>
-            <a:endParaRPr lang="fr-FR"/>
-          </a:p>
-        </p:txBody>
-      </p:sp>
+            <a:endParaRPr lang="fr-FR" dirty="0"/>
+          </a:p>
+          <a:p>
+            <a:r>
+              <a:rPr lang="fr-FR" dirty="0"/>
+              <a:t>Mise en relation acheteur/vendeur</a:t>
+            </a:r>
+          </a:p>
+          <a:p>
+            <a:endParaRPr lang="fr-FR" dirty="0"/>
+          </a:p>
+          <a:p>
+            <a:endParaRPr lang="fr-FR" dirty="0"/>
+          </a:p>
+          <a:p>
+            <a:endParaRPr lang="fr-FR" dirty="0"/>
+          </a:p>
+          <a:p>
+            <a:r>
+              <a:rPr lang="fr-FR" dirty="0"/>
+              <a:t>système d’enchères</a:t>
+            </a:r>
+          </a:p>
+        </p:txBody>
+      </p:sp>
+      <p:pic>
+        <p:nvPicPr>
+          <p:cNvPr id="4" name="Image 3">
+            <a:extLst>
+              <a:ext uri="{FF2B5EF4-FFF2-40B4-BE49-F238E27FC236}">
+                <a16:creationId xmlns:a16="http://schemas.microsoft.com/office/drawing/2014/main" id="{FC176C15-4AA3-4421-85D1-B849D9592698}"/>
+              </a:ext>
+            </a:extLst>
+          </p:cNvPr>
+          <p:cNvPicPr>
+            <a:picLocks noChangeAspect="1"/>
+          </p:cNvPicPr>
+          <p:nvPr/>
+        </p:nvPicPr>
+        <p:blipFill>
+          <a:blip r:embed="rId2">
+            <a:extLst>
+              <a:ext uri="{28A0092B-C50C-407E-A947-70E740481C1C}">
+                <a14:useLocalDpi xmlns:a14="http://schemas.microsoft.com/office/drawing/2010/main" val="0"/>
+              </a:ext>
+            </a:extLst>
+          </a:blip>
+          <a:stretch>
+            <a:fillRect/>
+          </a:stretch>
+        </p:blipFill>
+        <p:spPr>
+          <a:xfrm>
+            <a:off x="5652732" y="3061007"/>
+            <a:ext cx="4762500" cy="2619375"/>
+          </a:xfrm>
+          <a:prstGeom prst="rect">
+            <a:avLst/>
+          </a:prstGeom>
+        </p:spPr>
+      </p:pic>
     </p:spTree>
     <p:extLst>
       <p:ext uri="{BB962C8B-B14F-4D97-AF65-F5344CB8AC3E}">
@@ -4197,6 +5879,9 @@
   <p:clrMapOvr>
     <a:masterClrMapping/>
   </p:clrMapOvr>
+  <p:transition spd="med">
+    <p:pull/>
+  </p:transition>
 </p:sld>
 </file>
 
@@ -4238,6 +5923,7 @@
           <a:bodyPr/>
           <a:lstStyle/>
           <a:p>
+            <a:pPr algn="ctr"/>
             <a:r>
               <a:rPr lang="fr-FR" dirty="0"/>
               <a:t>Existant</a:t>
@@ -4245,31 +5931,40 @@
           </a:p>
         </p:txBody>
       </p:sp>
-      <p:sp>
-        <p:nvSpPr>
-          <p:cNvPr id="3" name="Espace réservé du contenu 2">
-            <a:extLst>
-              <a:ext uri="{FF2B5EF4-FFF2-40B4-BE49-F238E27FC236}">
-                <a16:creationId xmlns:a16="http://schemas.microsoft.com/office/drawing/2014/main" id="{E3F55B96-9C4E-4141-B32A-812185D14E1E}"/>
-              </a:ext>
-            </a:extLst>
-          </p:cNvPr>
-          <p:cNvSpPr>
-            <a:spLocks noGrp="1"/>
-          </p:cNvSpPr>
-          <p:nvPr>
-            <p:ph idx="1"/>
-          </p:nvPr>
-        </p:nvSpPr>
-        <p:spPr/>
-        <p:txBody>
-          <a:bodyPr/>
-          <a:lstStyle/>
-          <a:p>
-            <a:endParaRPr lang="fr-FR"/>
-          </a:p>
-        </p:txBody>
-      </p:sp>
+      <p:pic>
+        <p:nvPicPr>
+          <p:cNvPr id="6" name="Image 5">
+            <a:extLst>
+              <a:ext uri="{FF2B5EF4-FFF2-40B4-BE49-F238E27FC236}">
+                <a16:creationId xmlns:a16="http://schemas.microsoft.com/office/drawing/2014/main" id="{8F07C231-22C1-4BE1-B1F9-ACFB8456135B}"/>
+              </a:ext>
+            </a:extLst>
+          </p:cNvPr>
+          <p:cNvPicPr/>
+          <p:nvPr/>
+        </p:nvPicPr>
+        <p:blipFill>
+          <a:blip r:embed="rId2">
+            <a:extLst>
+              <a:ext uri="{28A0092B-C50C-407E-A947-70E740481C1C}">
+                <a14:useLocalDpi xmlns:a14="http://schemas.microsoft.com/office/drawing/2010/main" val="0"/>
+              </a:ext>
+            </a:extLst>
+          </a:blip>
+          <a:stretch>
+            <a:fillRect/>
+          </a:stretch>
+        </p:blipFill>
+        <p:spPr>
+          <a:xfrm>
+            <a:off x="2320789" y="1690688"/>
+            <a:ext cx="7550421" cy="4014076"/>
+          </a:xfrm>
+          <a:prstGeom prst="rect">
+            <a:avLst/>
+          </a:prstGeom>
+        </p:spPr>
+      </p:pic>
     </p:spTree>
     <p:extLst>
       <p:ext uri="{BB962C8B-B14F-4D97-AF65-F5344CB8AC3E}">
@@ -4280,6 +5975,174 @@
   <p:clrMapOvr>
     <a:masterClrMapping/>
   </p:clrMapOvr>
+  <p:transition spd="med">
+    <p:pull/>
+  </p:transition>
+</p:sld>
+</file>
+
+<file path=ppt/slides/slide8.xml><?xml version="1.0" encoding="utf-8"?>
+<p:sld xmlns:a="http://schemas.openxmlformats.org/drawingml/2006/main" xmlns:r="http://schemas.openxmlformats.org/officeDocument/2006/relationships" xmlns:p="http://schemas.openxmlformats.org/presentationml/2006/main">
+  <p:cSld>
+    <p:spTree>
+      <p:nvGrpSpPr>
+        <p:cNvPr id="1" name=""/>
+        <p:cNvGrpSpPr/>
+        <p:nvPr/>
+      </p:nvGrpSpPr>
+      <p:grpSpPr>
+        <a:xfrm>
+          <a:off x="0" y="0"/>
+          <a:ext cx="0" cy="0"/>
+          <a:chOff x="0" y="0"/>
+          <a:chExt cx="0" cy="0"/>
+        </a:xfrm>
+      </p:grpSpPr>
+      <p:sp>
+        <p:nvSpPr>
+          <p:cNvPr id="2" name="Titre 1">
+            <a:extLst>
+              <a:ext uri="{FF2B5EF4-FFF2-40B4-BE49-F238E27FC236}">
+                <a16:creationId xmlns:a16="http://schemas.microsoft.com/office/drawing/2014/main" id="{1DDE73FF-71A9-483B-8DD9-706B83BFCFA8}"/>
+              </a:ext>
+            </a:extLst>
+          </p:cNvPr>
+          <p:cNvSpPr>
+            <a:spLocks noGrp="1"/>
+          </p:cNvSpPr>
+          <p:nvPr>
+            <p:ph type="title"/>
+          </p:nvPr>
+        </p:nvSpPr>
+        <p:spPr/>
+        <p:txBody>
+          <a:bodyPr/>
+          <a:lstStyle/>
+          <a:p>
+            <a:pPr algn="ctr"/>
+            <a:r>
+              <a:rPr lang="fr-FR" dirty="0"/>
+              <a:t>Existant</a:t>
+            </a:r>
+          </a:p>
+        </p:txBody>
+      </p:sp>
+      <p:pic>
+        <p:nvPicPr>
+          <p:cNvPr id="4" name="Image 3">
+            <a:extLst>
+              <a:ext uri="{FF2B5EF4-FFF2-40B4-BE49-F238E27FC236}">
+                <a16:creationId xmlns:a16="http://schemas.microsoft.com/office/drawing/2014/main" id="{5098AC21-7C18-4402-8FE5-174C77786F4D}"/>
+              </a:ext>
+            </a:extLst>
+          </p:cNvPr>
+          <p:cNvPicPr/>
+          <p:nvPr/>
+        </p:nvPicPr>
+        <p:blipFill>
+          <a:blip r:embed="rId2"/>
+          <a:stretch>
+            <a:fillRect/>
+          </a:stretch>
+        </p:blipFill>
+        <p:spPr>
+          <a:xfrm>
+            <a:off x="2527390" y="1690688"/>
+            <a:ext cx="7137220" cy="3904894"/>
+          </a:xfrm>
+          <a:prstGeom prst="rect">
+            <a:avLst/>
+          </a:prstGeom>
+        </p:spPr>
+      </p:pic>
+    </p:spTree>
+    <p:extLst>
+      <p:ext uri="{BB962C8B-B14F-4D97-AF65-F5344CB8AC3E}">
+        <p14:creationId xmlns:p14="http://schemas.microsoft.com/office/powerpoint/2010/main" val="1305358133"/>
+      </p:ext>
+    </p:extLst>
+  </p:cSld>
+  <p:clrMapOvr>
+    <a:masterClrMapping/>
+  </p:clrMapOvr>
+  <mc:AlternateContent xmlns:mc="http://schemas.openxmlformats.org/markup-compatibility/2006">
+    <mc:Choice xmlns:p14="http://schemas.microsoft.com/office/powerpoint/2010/main" Requires="p14">
+      <p:transition spd="med" p14:dur="700">
+        <p:fade/>
+      </p:transition>
+    </mc:Choice>
+    <mc:Fallback>
+      <p:transition spd="med">
+        <p:fade/>
+      </p:transition>
+    </mc:Fallback>
+  </mc:AlternateContent>
+</p:sld>
+</file>
+
+<file path=ppt/slides/slide9.xml><?xml version="1.0" encoding="utf-8"?>
+<p:sld xmlns:a="http://schemas.openxmlformats.org/drawingml/2006/main" xmlns:r="http://schemas.openxmlformats.org/officeDocument/2006/relationships" xmlns:p="http://schemas.openxmlformats.org/presentationml/2006/main">
+  <p:cSld>
+    <p:spTree>
+      <p:nvGrpSpPr>
+        <p:cNvPr id="1" name=""/>
+        <p:cNvGrpSpPr/>
+        <p:nvPr/>
+      </p:nvGrpSpPr>
+      <p:grpSpPr>
+        <a:xfrm>
+          <a:off x="0" y="0"/>
+          <a:ext cx="0" cy="0"/>
+          <a:chOff x="0" y="0"/>
+          <a:chExt cx="0" cy="0"/>
+        </a:xfrm>
+      </p:grpSpPr>
+      <p:sp>
+        <p:nvSpPr>
+          <p:cNvPr id="2" name="Titre 1">
+            <a:extLst>
+              <a:ext uri="{FF2B5EF4-FFF2-40B4-BE49-F238E27FC236}">
+                <a16:creationId xmlns:a16="http://schemas.microsoft.com/office/drawing/2014/main" id="{BD02D718-1D53-4534-833A-08F45EEA5F33}"/>
+              </a:ext>
+            </a:extLst>
+          </p:cNvPr>
+          <p:cNvSpPr>
+            <a:spLocks noGrp="1"/>
+          </p:cNvSpPr>
+          <p:nvPr>
+            <p:ph type="ctrTitle"/>
+          </p:nvPr>
+        </p:nvSpPr>
+        <p:spPr>
+          <a:xfrm>
+            <a:off x="1619535" y="2497541"/>
+            <a:ext cx="9144000" cy="1842447"/>
+          </a:xfrm>
+        </p:spPr>
+        <p:txBody>
+          <a:bodyPr/>
+          <a:lstStyle/>
+          <a:p>
+            <a:r>
+              <a:rPr lang="fr-FR" dirty="0"/>
+              <a:t>Aspects fonctionnels et techniques</a:t>
+            </a:r>
+          </a:p>
+        </p:txBody>
+      </p:sp>
+    </p:spTree>
+    <p:extLst>
+      <p:ext uri="{BB962C8B-B14F-4D97-AF65-F5344CB8AC3E}">
+        <p14:creationId xmlns:p14="http://schemas.microsoft.com/office/powerpoint/2010/main" val="1492124468"/>
+      </p:ext>
+    </p:extLst>
+  </p:cSld>
+  <p:clrMapOvr>
+    <a:masterClrMapping/>
+  </p:clrMapOvr>
+  <p:transition spd="slow">
+    <p:push dir="u"/>
+  </p:transition>
 </p:sld>
 </file>
 

</xml_diff>

<commit_message>
MAJ Copte Rendu, Site Statique, modif ReadMe
</commit_message>
<xml_diff>
--- a/PrésentationBourseEchangeSCPI.pptx
+++ b/PrésentationBourseEchangeSCPI.pptx
@@ -5,7 +5,7 @@
     <p:sldMasterId id="2147483678" r:id="rId1"/>
   </p:sldMasterIdLst>
   <p:notesMasterIdLst>
-    <p:notesMasterId r:id="rId22"/>
+    <p:notesMasterId r:id="rId24"/>
   </p:notesMasterIdLst>
   <p:sldIdLst>
     <p:sldId id="256" r:id="rId2"/>
@@ -27,7 +27,9 @@
     <p:sldId id="275" r:id="rId18"/>
     <p:sldId id="276" r:id="rId19"/>
     <p:sldId id="277" r:id="rId20"/>
-    <p:sldId id="278" r:id="rId21"/>
+    <p:sldId id="280" r:id="rId21"/>
+    <p:sldId id="279" r:id="rId22"/>
+    <p:sldId id="278" r:id="rId23"/>
   </p:sldIdLst>
   <p:sldSz cx="12192000" cy="6858000"/>
   <p:notesSz cx="6858000" cy="9144000"/>
@@ -4078,7 +4080,7 @@
           <a:p>
             <a:r>
               <a:rPr lang="fr-FR" dirty="0"/>
-              <a:t>COMTE Thibault</a:t>
+              <a:t>COMTE Thibaut</a:t>
             </a:r>
           </a:p>
           <a:p>
@@ -5794,6 +5796,18 @@
               <a:rPr lang="fr-FR" dirty="0"/>
               <a:t>Conception et mise en place du modèle</a:t>
             </a:r>
+          </a:p>
+          <a:p>
+            <a:pPr marL="0" indent="0">
+              <a:buNone/>
+            </a:pPr>
+            <a:endParaRPr lang="fr-FR" dirty="0"/>
+          </a:p>
+          <a:p>
+            <a:pPr marL="0" indent="0">
+              <a:buNone/>
+            </a:pPr>
+            <a:endParaRPr lang="fr-FR" dirty="0"/>
           </a:p>
           <a:p>
             <a:pPr marL="0" indent="0">
@@ -7050,7 +7064,7 @@
         </p:spPr>
         <p:txBody>
           <a:bodyPr>
-            <a:normAutofit/>
+            <a:normAutofit lnSpcReduction="10000"/>
           </a:bodyPr>
           <a:lstStyle/>
           <a:p>
@@ -7159,6 +7173,15 @@
             <a:r>
               <a:rPr lang="fr-FR" sz="2000" dirty="0"/>
               <a:t>Diagrammes</a:t>
+            </a:r>
+          </a:p>
+          <a:p>
+            <a:pPr marL="457200" lvl="1" indent="0">
+              <a:buNone/>
+            </a:pPr>
+            <a:r>
+              <a:rPr lang="fr-FR" sz="2000" dirty="0"/>
+              <a:t>Tests Unitaires</a:t>
             </a:r>
           </a:p>
         </p:txBody>
@@ -7433,47 +7456,12 @@
           <a:chExt cx="0" cy="0"/>
         </a:xfrm>
       </p:grpSpPr>
-      <p:pic>
-        <p:nvPicPr>
-          <p:cNvPr id="7" name="Espace réservé du contenu 6">
-            <a:extLst>
-              <a:ext uri="{FF2B5EF4-FFF2-40B4-BE49-F238E27FC236}">
-                <a16:creationId xmlns:a16="http://schemas.microsoft.com/office/drawing/2014/main" id="{DA913018-F38E-43DE-8C96-B71E8154B542}"/>
-              </a:ext>
-            </a:extLst>
-          </p:cNvPr>
-          <p:cNvPicPr>
-            <a:picLocks noGrp="1" noChangeAspect="1"/>
-          </p:cNvPicPr>
-          <p:nvPr>
-            <p:ph idx="1"/>
-          </p:nvPr>
-        </p:nvPicPr>
-        <p:blipFill>
-          <a:blip r:embed="rId2">
-            <a:extLst>
-              <a:ext uri="{28A0092B-C50C-407E-A947-70E740481C1C}">
-                <a14:useLocalDpi xmlns:a14="http://schemas.microsoft.com/office/drawing/2010/main" val="0"/>
-              </a:ext>
-            </a:extLst>
-          </a:blip>
-          <a:stretch>
-            <a:fillRect/>
-          </a:stretch>
-        </p:blipFill>
-        <p:spPr>
-          <a:xfrm>
-            <a:off x="4493026" y="1289938"/>
-            <a:ext cx="3205948" cy="4073631"/>
-          </a:xfrm>
-        </p:spPr>
-      </p:pic>
-      <p:sp>
-        <p:nvSpPr>
-          <p:cNvPr id="4" name="Espace réservé du numéro de diapositive 6">
-            <a:extLst>
-              <a:ext uri="{FF2B5EF4-FFF2-40B4-BE49-F238E27FC236}">
-                <a16:creationId xmlns:a16="http://schemas.microsoft.com/office/drawing/2014/main" id="{E672ACD0-DC57-4065-ABC5-1FDA5D6C2709}"/>
+      <p:sp>
+        <p:nvSpPr>
+          <p:cNvPr id="6" name="Espace réservé du numéro de diapositive 6">
+            <a:extLst>
+              <a:ext uri="{FF2B5EF4-FFF2-40B4-BE49-F238E27FC236}">
+                <a16:creationId xmlns:a16="http://schemas.microsoft.com/office/drawing/2014/main" id="{1B2598F9-9C51-497B-96A7-D60832FC6729}"/>
               </a:ext>
             </a:extLst>
           </p:cNvPr>
@@ -7501,6 +7489,515 @@
                 </a:solidFill>
               </a:rPr>
               <a:t>20</a:t>
+            </a:fld>
+            <a:endParaRPr lang="fr-FR" dirty="0">
+              <a:solidFill>
+                <a:schemeClr val="tx1"/>
+              </a:solidFill>
+            </a:endParaRPr>
+          </a:p>
+        </p:txBody>
+      </p:sp>
+      <p:pic>
+        <p:nvPicPr>
+          <p:cNvPr id="7" name="Image 6" descr="ECETech_logo.jpg">
+            <a:extLst>
+              <a:ext uri="{FF2B5EF4-FFF2-40B4-BE49-F238E27FC236}">
+                <a16:creationId xmlns:a16="http://schemas.microsoft.com/office/drawing/2014/main" id="{0CD1CD77-BAAE-4640-B572-45931F1F9B5B}"/>
+              </a:ext>
+            </a:extLst>
+          </p:cNvPr>
+          <p:cNvPicPr>
+            <a:picLocks noChangeAspect="1"/>
+          </p:cNvPicPr>
+          <p:nvPr/>
+        </p:nvPicPr>
+        <p:blipFill>
+          <a:blip r:embed="rId2" cstate="print">
+            <a:extLst>
+              <a:ext uri="{28A0092B-C50C-407E-A947-70E740481C1C}">
+                <a14:useLocalDpi xmlns:a14="http://schemas.microsoft.com/office/drawing/2010/main" val="0"/>
+              </a:ext>
+            </a:extLst>
+          </a:blip>
+          <a:stretch>
+            <a:fillRect/>
+          </a:stretch>
+        </p:blipFill>
+        <p:spPr>
+          <a:xfrm>
+            <a:off x="1895848" y="210389"/>
+            <a:ext cx="3048856" cy="685799"/>
+          </a:xfrm>
+          <a:prstGeom prst="rect">
+            <a:avLst/>
+          </a:prstGeom>
+        </p:spPr>
+      </p:pic>
+      <p:pic>
+        <p:nvPicPr>
+          <p:cNvPr id="8" name="Image 7">
+            <a:extLst>
+              <a:ext uri="{FF2B5EF4-FFF2-40B4-BE49-F238E27FC236}">
+                <a16:creationId xmlns:a16="http://schemas.microsoft.com/office/drawing/2014/main" id="{0BC97F23-0C3E-4364-B9F2-33B5E6F52E93}"/>
+              </a:ext>
+            </a:extLst>
+          </p:cNvPr>
+          <p:cNvPicPr>
+            <a:picLocks noChangeAspect="1"/>
+          </p:cNvPicPr>
+          <p:nvPr/>
+        </p:nvPicPr>
+        <p:blipFill>
+          <a:blip r:embed="rId3">
+            <a:extLst>
+              <a:ext uri="{28A0092B-C50C-407E-A947-70E740481C1C}">
+                <a14:useLocalDpi xmlns:a14="http://schemas.microsoft.com/office/drawing/2010/main" val="0"/>
+              </a:ext>
+            </a:extLst>
+          </a:blip>
+          <a:stretch>
+            <a:fillRect/>
+          </a:stretch>
+        </p:blipFill>
+        <p:spPr>
+          <a:xfrm>
+            <a:off x="9359900" y="896188"/>
+            <a:ext cx="2832100" cy="787400"/>
+          </a:xfrm>
+          <a:prstGeom prst="rect">
+            <a:avLst/>
+          </a:prstGeom>
+        </p:spPr>
+      </p:pic>
+      <p:sp>
+        <p:nvSpPr>
+          <p:cNvPr id="9" name="Titre 1">
+            <a:extLst>
+              <a:ext uri="{FF2B5EF4-FFF2-40B4-BE49-F238E27FC236}">
+                <a16:creationId xmlns:a16="http://schemas.microsoft.com/office/drawing/2014/main" id="{16B4BC55-870C-409B-A02A-84A61A3C08DC}"/>
+              </a:ext>
+            </a:extLst>
+          </p:cNvPr>
+          <p:cNvSpPr>
+            <a:spLocks noGrp="1"/>
+          </p:cNvSpPr>
+          <p:nvPr>
+            <p:ph type="title"/>
+          </p:nvPr>
+        </p:nvSpPr>
+        <p:spPr>
+          <a:xfrm>
+            <a:off x="7873125" y="223818"/>
+            <a:ext cx="3460393" cy="678043"/>
+          </a:xfrm>
+        </p:spPr>
+        <p:txBody>
+          <a:bodyPr>
+            <a:normAutofit fontScale="90000"/>
+          </a:bodyPr>
+          <a:lstStyle/>
+          <a:p>
+            <a:pPr algn="ctr"/>
+            <a:r>
+              <a:rPr lang="fr-FR" dirty="0">
+                <a:solidFill>
+                  <a:schemeClr val="accent2"/>
+                </a:solidFill>
+              </a:rPr>
+              <a:t>Tests unitaires</a:t>
+            </a:r>
+          </a:p>
+        </p:txBody>
+      </p:sp>
+      <p:pic>
+        <p:nvPicPr>
+          <p:cNvPr id="10" name="Image 9">
+            <a:extLst>
+              <a:ext uri="{FF2B5EF4-FFF2-40B4-BE49-F238E27FC236}">
+                <a16:creationId xmlns:a16="http://schemas.microsoft.com/office/drawing/2014/main" id="{B33FED34-0715-4F30-888B-EF402EB0F776}"/>
+              </a:ext>
+            </a:extLst>
+          </p:cNvPr>
+          <p:cNvPicPr>
+            <a:picLocks noChangeAspect="1"/>
+          </p:cNvPicPr>
+          <p:nvPr/>
+        </p:nvPicPr>
+        <p:blipFill>
+          <a:blip r:embed="rId4">
+            <a:extLst>
+              <a:ext uri="{28A0092B-C50C-407E-A947-70E740481C1C}">
+                <a14:useLocalDpi xmlns:a14="http://schemas.microsoft.com/office/drawing/2010/main" val="0"/>
+              </a:ext>
+            </a:extLst>
+          </a:blip>
+          <a:stretch>
+            <a:fillRect/>
+          </a:stretch>
+        </p:blipFill>
+        <p:spPr>
+          <a:xfrm>
+            <a:off x="673254" y="1562346"/>
+            <a:ext cx="8542900" cy="4675703"/>
+          </a:xfrm>
+          <a:prstGeom prst="rect">
+            <a:avLst/>
+          </a:prstGeom>
+        </p:spPr>
+      </p:pic>
+    </p:spTree>
+    <p:extLst>
+      <p:ext uri="{BB962C8B-B14F-4D97-AF65-F5344CB8AC3E}">
+        <p14:creationId xmlns:p14="http://schemas.microsoft.com/office/powerpoint/2010/main" val="3580634530"/>
+      </p:ext>
+    </p:extLst>
+  </p:cSld>
+  <p:clrMapOvr>
+    <a:masterClrMapping/>
+  </p:clrMapOvr>
+  <p:transition spd="med">
+    <p:pull/>
+  </p:transition>
+</p:sld>
+</file>
+
+<file path=ppt/slides/slide21.xml><?xml version="1.0" encoding="utf-8"?>
+<p:sld xmlns:a="http://schemas.openxmlformats.org/drawingml/2006/main" xmlns:r="http://schemas.openxmlformats.org/officeDocument/2006/relationships" xmlns:p="http://schemas.openxmlformats.org/presentationml/2006/main">
+  <p:cSld>
+    <p:spTree>
+      <p:nvGrpSpPr>
+        <p:cNvPr id="1" name=""/>
+        <p:cNvGrpSpPr/>
+        <p:nvPr/>
+      </p:nvGrpSpPr>
+      <p:grpSpPr>
+        <a:xfrm>
+          <a:off x="0" y="0"/>
+          <a:ext cx="0" cy="0"/>
+          <a:chOff x="0" y="0"/>
+          <a:chExt cx="0" cy="0"/>
+        </a:xfrm>
+      </p:grpSpPr>
+      <p:sp>
+        <p:nvSpPr>
+          <p:cNvPr id="6" name="Espace réservé du numéro de diapositive 6">
+            <a:extLst>
+              <a:ext uri="{FF2B5EF4-FFF2-40B4-BE49-F238E27FC236}">
+                <a16:creationId xmlns:a16="http://schemas.microsoft.com/office/drawing/2014/main" id="{1B2598F9-9C51-497B-96A7-D60832FC6729}"/>
+              </a:ext>
+            </a:extLst>
+          </p:cNvPr>
+          <p:cNvSpPr>
+            <a:spLocks noGrp="1"/>
+          </p:cNvSpPr>
+          <p:nvPr>
+            <p:ph type="sldNum" sz="quarter" idx="12"/>
+          </p:nvPr>
+        </p:nvSpPr>
+        <p:spPr>
+          <a:xfrm>
+            <a:off x="10951856" y="5883275"/>
+            <a:ext cx="1240144" cy="974725"/>
+          </a:xfrm>
+        </p:spPr>
+        <p:txBody>
+          <a:bodyPr/>
+          <a:lstStyle/>
+          <a:p>
+            <a:fld id="{C3971EB4-5D69-478D-A898-C8EFE65792CC}" type="slidenum">
+              <a:rPr lang="fr-FR" sz="3600" smtClean="0">
+                <a:solidFill>
+                  <a:schemeClr val="tx1"/>
+                </a:solidFill>
+              </a:rPr>
+              <a:t>21</a:t>
+            </a:fld>
+            <a:endParaRPr lang="fr-FR" dirty="0">
+              <a:solidFill>
+                <a:schemeClr val="tx1"/>
+              </a:solidFill>
+            </a:endParaRPr>
+          </a:p>
+        </p:txBody>
+      </p:sp>
+      <p:pic>
+        <p:nvPicPr>
+          <p:cNvPr id="7" name="Image 6" descr="ECETech_logo.jpg">
+            <a:extLst>
+              <a:ext uri="{FF2B5EF4-FFF2-40B4-BE49-F238E27FC236}">
+                <a16:creationId xmlns:a16="http://schemas.microsoft.com/office/drawing/2014/main" id="{0CD1CD77-BAAE-4640-B572-45931F1F9B5B}"/>
+              </a:ext>
+            </a:extLst>
+          </p:cNvPr>
+          <p:cNvPicPr>
+            <a:picLocks noChangeAspect="1"/>
+          </p:cNvPicPr>
+          <p:nvPr/>
+        </p:nvPicPr>
+        <p:blipFill>
+          <a:blip r:embed="rId2" cstate="print">
+            <a:extLst>
+              <a:ext uri="{28A0092B-C50C-407E-A947-70E740481C1C}">
+                <a14:useLocalDpi xmlns:a14="http://schemas.microsoft.com/office/drawing/2010/main" val="0"/>
+              </a:ext>
+            </a:extLst>
+          </a:blip>
+          <a:stretch>
+            <a:fillRect/>
+          </a:stretch>
+        </p:blipFill>
+        <p:spPr>
+          <a:xfrm>
+            <a:off x="1895848" y="210389"/>
+            <a:ext cx="3048856" cy="685799"/>
+          </a:xfrm>
+          <a:prstGeom prst="rect">
+            <a:avLst/>
+          </a:prstGeom>
+        </p:spPr>
+      </p:pic>
+      <p:pic>
+        <p:nvPicPr>
+          <p:cNvPr id="8" name="Image 7">
+            <a:extLst>
+              <a:ext uri="{FF2B5EF4-FFF2-40B4-BE49-F238E27FC236}">
+                <a16:creationId xmlns:a16="http://schemas.microsoft.com/office/drawing/2014/main" id="{0BC97F23-0C3E-4364-B9F2-33B5E6F52E93}"/>
+              </a:ext>
+            </a:extLst>
+          </p:cNvPr>
+          <p:cNvPicPr>
+            <a:picLocks noChangeAspect="1"/>
+          </p:cNvPicPr>
+          <p:nvPr/>
+        </p:nvPicPr>
+        <p:blipFill>
+          <a:blip r:embed="rId3">
+            <a:extLst>
+              <a:ext uri="{28A0092B-C50C-407E-A947-70E740481C1C}">
+                <a14:useLocalDpi xmlns:a14="http://schemas.microsoft.com/office/drawing/2010/main" val="0"/>
+              </a:ext>
+            </a:extLst>
+          </a:blip>
+          <a:stretch>
+            <a:fillRect/>
+          </a:stretch>
+        </p:blipFill>
+        <p:spPr>
+          <a:xfrm>
+            <a:off x="9359900" y="896188"/>
+            <a:ext cx="2832100" cy="787400"/>
+          </a:xfrm>
+          <a:prstGeom prst="rect">
+            <a:avLst/>
+          </a:prstGeom>
+        </p:spPr>
+      </p:pic>
+      <p:sp>
+        <p:nvSpPr>
+          <p:cNvPr id="9" name="Titre 1">
+            <a:extLst>
+              <a:ext uri="{FF2B5EF4-FFF2-40B4-BE49-F238E27FC236}">
+                <a16:creationId xmlns:a16="http://schemas.microsoft.com/office/drawing/2014/main" id="{16B4BC55-870C-409B-A02A-84A61A3C08DC}"/>
+              </a:ext>
+            </a:extLst>
+          </p:cNvPr>
+          <p:cNvSpPr>
+            <a:spLocks noGrp="1"/>
+          </p:cNvSpPr>
+          <p:nvPr>
+            <p:ph type="title"/>
+          </p:nvPr>
+        </p:nvSpPr>
+        <p:spPr>
+          <a:xfrm>
+            <a:off x="7873125" y="223818"/>
+            <a:ext cx="3460393" cy="678043"/>
+          </a:xfrm>
+        </p:spPr>
+        <p:txBody>
+          <a:bodyPr>
+            <a:normAutofit fontScale="90000"/>
+          </a:bodyPr>
+          <a:lstStyle/>
+          <a:p>
+            <a:pPr algn="ctr"/>
+            <a:r>
+              <a:rPr lang="fr-FR" dirty="0">
+                <a:solidFill>
+                  <a:schemeClr val="accent2"/>
+                </a:solidFill>
+              </a:rPr>
+              <a:t>Conclusion</a:t>
+            </a:r>
+          </a:p>
+        </p:txBody>
+      </p:sp>
+      <p:pic>
+        <p:nvPicPr>
+          <p:cNvPr id="10" name="Image 9">
+            <a:extLst>
+              <a:ext uri="{FF2B5EF4-FFF2-40B4-BE49-F238E27FC236}">
+                <a16:creationId xmlns:a16="http://schemas.microsoft.com/office/drawing/2014/main" id="{756AD85B-2F6B-40A7-B249-397DAA7EF78F}"/>
+              </a:ext>
+            </a:extLst>
+          </p:cNvPr>
+          <p:cNvPicPr>
+            <a:picLocks noChangeAspect="1"/>
+          </p:cNvPicPr>
+          <p:nvPr/>
+        </p:nvPicPr>
+        <p:blipFill>
+          <a:blip r:embed="rId4">
+            <a:extLst>
+              <a:ext uri="{28A0092B-C50C-407E-A947-70E740481C1C}">
+                <a14:useLocalDpi xmlns:a14="http://schemas.microsoft.com/office/drawing/2010/main" val="0"/>
+              </a:ext>
+            </a:extLst>
+          </a:blip>
+          <a:stretch>
+            <a:fillRect/>
+          </a:stretch>
+        </p:blipFill>
+        <p:spPr>
+          <a:xfrm>
+            <a:off x="1039026" y="2392267"/>
+            <a:ext cx="4762500" cy="2619375"/>
+          </a:xfrm>
+          <a:prstGeom prst="rect">
+            <a:avLst/>
+          </a:prstGeom>
+        </p:spPr>
+      </p:pic>
+      <p:pic>
+        <p:nvPicPr>
+          <p:cNvPr id="11" name="Image 10">
+            <a:extLst>
+              <a:ext uri="{FF2B5EF4-FFF2-40B4-BE49-F238E27FC236}">
+                <a16:creationId xmlns:a16="http://schemas.microsoft.com/office/drawing/2014/main" id="{5775E06C-A0BD-4F00-A04E-86F7F42CB3B5}"/>
+              </a:ext>
+            </a:extLst>
+          </p:cNvPr>
+          <p:cNvPicPr/>
+          <p:nvPr/>
+        </p:nvPicPr>
+        <p:blipFill>
+          <a:blip r:embed="rId5"/>
+          <a:stretch>
+            <a:fillRect/>
+          </a:stretch>
+        </p:blipFill>
+        <p:spPr>
+          <a:xfrm>
+            <a:off x="6741993" y="2392267"/>
+            <a:ext cx="4493991" cy="2758482"/>
+          </a:xfrm>
+          <a:prstGeom prst="rect">
+            <a:avLst/>
+          </a:prstGeom>
+        </p:spPr>
+      </p:pic>
+    </p:spTree>
+    <p:extLst>
+      <p:ext uri="{BB962C8B-B14F-4D97-AF65-F5344CB8AC3E}">
+        <p14:creationId xmlns:p14="http://schemas.microsoft.com/office/powerpoint/2010/main" val="1531215848"/>
+      </p:ext>
+    </p:extLst>
+  </p:cSld>
+  <p:clrMapOvr>
+    <a:masterClrMapping/>
+  </p:clrMapOvr>
+  <p:transition spd="med">
+    <p:pull/>
+  </p:transition>
+</p:sld>
+</file>
+
+<file path=ppt/slides/slide22.xml><?xml version="1.0" encoding="utf-8"?>
+<p:sld xmlns:a="http://schemas.openxmlformats.org/drawingml/2006/main" xmlns:r="http://schemas.openxmlformats.org/officeDocument/2006/relationships" xmlns:p="http://schemas.openxmlformats.org/presentationml/2006/main">
+  <p:cSld>
+    <p:spTree>
+      <p:nvGrpSpPr>
+        <p:cNvPr id="1" name=""/>
+        <p:cNvGrpSpPr/>
+        <p:nvPr/>
+      </p:nvGrpSpPr>
+      <p:grpSpPr>
+        <a:xfrm>
+          <a:off x="0" y="0"/>
+          <a:ext cx="0" cy="0"/>
+          <a:chOff x="0" y="0"/>
+          <a:chExt cx="0" cy="0"/>
+        </a:xfrm>
+      </p:grpSpPr>
+      <p:pic>
+        <p:nvPicPr>
+          <p:cNvPr id="7" name="Espace réservé du contenu 6">
+            <a:extLst>
+              <a:ext uri="{FF2B5EF4-FFF2-40B4-BE49-F238E27FC236}">
+                <a16:creationId xmlns:a16="http://schemas.microsoft.com/office/drawing/2014/main" id="{DA913018-F38E-43DE-8C96-B71E8154B542}"/>
+              </a:ext>
+            </a:extLst>
+          </p:cNvPr>
+          <p:cNvPicPr>
+            <a:picLocks noGrp="1" noChangeAspect="1"/>
+          </p:cNvPicPr>
+          <p:nvPr>
+            <p:ph idx="1"/>
+          </p:nvPr>
+        </p:nvPicPr>
+        <p:blipFill>
+          <a:blip r:embed="rId2">
+            <a:extLst>
+              <a:ext uri="{28A0092B-C50C-407E-A947-70E740481C1C}">
+                <a14:useLocalDpi xmlns:a14="http://schemas.microsoft.com/office/drawing/2010/main" val="0"/>
+              </a:ext>
+            </a:extLst>
+          </a:blip>
+          <a:stretch>
+            <a:fillRect/>
+          </a:stretch>
+        </p:blipFill>
+        <p:spPr>
+          <a:xfrm>
+            <a:off x="4493026" y="1289938"/>
+            <a:ext cx="3205948" cy="4073631"/>
+          </a:xfrm>
+        </p:spPr>
+      </p:pic>
+      <p:sp>
+        <p:nvSpPr>
+          <p:cNvPr id="4" name="Espace réservé du numéro de diapositive 6">
+            <a:extLst>
+              <a:ext uri="{FF2B5EF4-FFF2-40B4-BE49-F238E27FC236}">
+                <a16:creationId xmlns:a16="http://schemas.microsoft.com/office/drawing/2014/main" id="{E672ACD0-DC57-4065-ABC5-1FDA5D6C2709}"/>
+              </a:ext>
+            </a:extLst>
+          </p:cNvPr>
+          <p:cNvSpPr>
+            <a:spLocks noGrp="1"/>
+          </p:cNvSpPr>
+          <p:nvPr>
+            <p:ph type="sldNum" sz="quarter" idx="12"/>
+          </p:nvPr>
+        </p:nvSpPr>
+        <p:spPr>
+          <a:xfrm>
+            <a:off x="10951856" y="5883275"/>
+            <a:ext cx="1240144" cy="974725"/>
+          </a:xfrm>
+        </p:spPr>
+        <p:txBody>
+          <a:bodyPr/>
+          <a:lstStyle/>
+          <a:p>
+            <a:fld id="{C3971EB4-5D69-478D-A898-C8EFE65792CC}" type="slidenum">
+              <a:rPr lang="fr-FR" sz="3600" smtClean="0">
+                <a:solidFill>
+                  <a:schemeClr val="tx1"/>
+                </a:solidFill>
+              </a:rPr>
+              <a:t>22</a:t>
             </a:fld>
             <a:endParaRPr lang="fr-FR" dirty="0">
               <a:solidFill>
@@ -7604,7 +8101,7 @@
             </a:pPr>
             <a:r>
               <a:rPr lang="fr-FR" dirty="0"/>
-              <a:t>	rendement </a:t>
+              <a:t>	- rendement </a:t>
             </a:r>
           </a:p>
           <a:p>
@@ -7619,7 +8116,7 @@
             </a:pPr>
             <a:r>
               <a:rPr lang="fr-FR" dirty="0"/>
-              <a:t>	plus-value</a:t>
+              <a:t>	- plus-value</a:t>
             </a:r>
           </a:p>
           <a:p>
@@ -7634,7 +8131,7 @@
             </a:pPr>
             <a:r>
               <a:rPr lang="fr-FR" dirty="0"/>
-              <a:t>	fiscales</a:t>
+              <a:t>	- fiscales</a:t>
             </a:r>
           </a:p>
         </p:txBody>

</xml_diff>